<commit_message>
final Abgabe + Presentation
</commit_message>
<xml_diff>
--- a/präsentation.pptx
+++ b/präsentation.pptx
@@ -8,39 +8,36 @@
     <p:sldId id="256" r:id="rId2"/>
     <p:sldId id="260" r:id="rId3"/>
     <p:sldId id="257" r:id="rId4"/>
-    <p:sldId id="261" r:id="rId5"/>
-    <p:sldId id="262" r:id="rId6"/>
-    <p:sldId id="259" r:id="rId7"/>
-    <p:sldId id="263" r:id="rId8"/>
-    <p:sldId id="264" r:id="rId9"/>
-    <p:sldId id="265" r:id="rId10"/>
-    <p:sldId id="266" r:id="rId11"/>
-    <p:sldId id="267" r:id="rId12"/>
-    <p:sldId id="268" r:id="rId13"/>
-    <p:sldId id="269" r:id="rId14"/>
-    <p:sldId id="270" r:id="rId15"/>
-    <p:sldId id="271" r:id="rId16"/>
-    <p:sldId id="258" r:id="rId17"/>
-    <p:sldId id="272" r:id="rId18"/>
-    <p:sldId id="273" r:id="rId19"/>
-    <p:sldId id="274" r:id="rId20"/>
-    <p:sldId id="275" r:id="rId21"/>
-    <p:sldId id="276" r:id="rId22"/>
-    <p:sldId id="277" r:id="rId23"/>
-    <p:sldId id="278" r:id="rId24"/>
-    <p:sldId id="279" r:id="rId25"/>
-    <p:sldId id="280" r:id="rId26"/>
-    <p:sldId id="281" r:id="rId27"/>
-    <p:sldId id="283" r:id="rId28"/>
-    <p:sldId id="284" r:id="rId29"/>
-    <p:sldId id="285" r:id="rId30"/>
-    <p:sldId id="286" r:id="rId31"/>
-    <p:sldId id="287" r:id="rId32"/>
-    <p:sldId id="288" r:id="rId33"/>
-    <p:sldId id="289" r:id="rId34"/>
-    <p:sldId id="290" r:id="rId35"/>
-    <p:sldId id="291" r:id="rId36"/>
-    <p:sldId id="292" r:id="rId37"/>
+    <p:sldId id="262" r:id="rId5"/>
+    <p:sldId id="259" r:id="rId6"/>
+    <p:sldId id="263" r:id="rId7"/>
+    <p:sldId id="264" r:id="rId8"/>
+    <p:sldId id="265" r:id="rId9"/>
+    <p:sldId id="266" r:id="rId10"/>
+    <p:sldId id="267" r:id="rId11"/>
+    <p:sldId id="268" r:id="rId12"/>
+    <p:sldId id="269" r:id="rId13"/>
+    <p:sldId id="270" r:id="rId14"/>
+    <p:sldId id="258" r:id="rId15"/>
+    <p:sldId id="272" r:id="rId16"/>
+    <p:sldId id="273" r:id="rId17"/>
+    <p:sldId id="274" r:id="rId18"/>
+    <p:sldId id="276" r:id="rId19"/>
+    <p:sldId id="277" r:id="rId20"/>
+    <p:sldId id="278" r:id="rId21"/>
+    <p:sldId id="279" r:id="rId22"/>
+    <p:sldId id="280" r:id="rId23"/>
+    <p:sldId id="281" r:id="rId24"/>
+    <p:sldId id="283" r:id="rId25"/>
+    <p:sldId id="284" r:id="rId26"/>
+    <p:sldId id="285" r:id="rId27"/>
+    <p:sldId id="286" r:id="rId28"/>
+    <p:sldId id="287" r:id="rId29"/>
+    <p:sldId id="288" r:id="rId30"/>
+    <p:sldId id="289" r:id="rId31"/>
+    <p:sldId id="290" r:id="rId32"/>
+    <p:sldId id="291" r:id="rId33"/>
+    <p:sldId id="292" r:id="rId34"/>
   </p:sldIdLst>
   <p:sldSz cx="12192000" cy="6858000"/>
   <p:notesSz cx="6858000" cy="9144000"/>
@@ -357,7 +354,7 @@
             <a:fld id="{53074F12-AA26-4AC8-9962-C36BB8F32554}" type="datetimeFigureOut">
               <a:rPr lang="en-US" smtClean="0"/>
               <a:pPr/>
-              <a:t>7/3/2025</a:t>
+              <a:t>7/4/2025</a:t>
             </a:fld>
             <a:endParaRPr lang="en-US"/>
           </a:p>
@@ -611,7 +608,7 @@
             <a:fld id="{53074F12-AA26-4AC8-9962-C36BB8F32554}" type="datetimeFigureOut">
               <a:rPr lang="en-US" smtClean="0"/>
               <a:pPr/>
-              <a:t>7/3/2025</a:t>
+              <a:t>7/4/2025</a:t>
             </a:fld>
             <a:endParaRPr lang="en-US"/>
           </a:p>
@@ -781,7 +778,7 @@
             <a:fld id="{53074F12-AA26-4AC8-9962-C36BB8F32554}" type="datetimeFigureOut">
               <a:rPr lang="en-US" smtClean="0"/>
               <a:pPr/>
-              <a:t>7/3/2025</a:t>
+              <a:t>7/4/2025</a:t>
             </a:fld>
             <a:endParaRPr lang="en-US"/>
           </a:p>
@@ -961,7 +958,7 @@
             <a:fld id="{53074F12-AA26-4AC8-9962-C36BB8F32554}" type="datetimeFigureOut">
               <a:rPr lang="en-US" smtClean="0"/>
               <a:pPr/>
-              <a:t>7/3/2025</a:t>
+              <a:t>7/4/2025</a:t>
             </a:fld>
             <a:endParaRPr lang="en-US"/>
           </a:p>
@@ -1187,7 +1184,7 @@
             <a:fld id="{53074F12-AA26-4AC8-9962-C36BB8F32554}" type="datetimeFigureOut">
               <a:rPr lang="en-US" smtClean="0"/>
               <a:pPr/>
-              <a:t>7/3/2025</a:t>
+              <a:t>7/4/2025</a:t>
             </a:fld>
             <a:endParaRPr lang="en-US"/>
           </a:p>
@@ -1413,7 +1410,7 @@
             <a:fld id="{53074F12-AA26-4AC8-9962-C36BB8F32554}" type="datetimeFigureOut">
               <a:rPr lang="en-US" smtClean="0"/>
               <a:pPr/>
-              <a:t>7/3/2025</a:t>
+              <a:t>7/4/2025</a:t>
             </a:fld>
             <a:endParaRPr lang="en-US"/>
           </a:p>
@@ -1660,7 +1657,7 @@
             <a:fld id="{53074F12-AA26-4AC8-9962-C36BB8F32554}" type="datetimeFigureOut">
               <a:rPr lang="en-US" smtClean="0"/>
               <a:pPr/>
-              <a:t>7/3/2025</a:t>
+              <a:t>7/4/2025</a:t>
             </a:fld>
             <a:endParaRPr lang="en-US"/>
           </a:p>
@@ -1947,7 +1944,7 @@
             <a:fld id="{53074F12-AA26-4AC8-9962-C36BB8F32554}" type="datetimeFigureOut">
               <a:rPr lang="en-US" smtClean="0"/>
               <a:pPr/>
-              <a:t>7/3/2025</a:t>
+              <a:t>7/4/2025</a:t>
             </a:fld>
             <a:endParaRPr lang="en-US"/>
           </a:p>
@@ -2427,7 +2424,7 @@
             <a:fld id="{53074F12-AA26-4AC8-9962-C36BB8F32554}" type="datetimeFigureOut">
               <a:rPr lang="en-US" smtClean="0"/>
               <a:pPr/>
-              <a:t>7/3/2025</a:t>
+              <a:t>7/4/2025</a:t>
             </a:fld>
             <a:endParaRPr lang="en-US"/>
           </a:p>
@@ -2546,7 +2543,7 @@
             <a:fld id="{53074F12-AA26-4AC8-9962-C36BB8F32554}" type="datetimeFigureOut">
               <a:rPr lang="en-US" smtClean="0"/>
               <a:pPr/>
-              <a:t>7/3/2025</a:t>
+              <a:t>7/4/2025</a:t>
             </a:fld>
             <a:endParaRPr lang="en-US"/>
           </a:p>
@@ -2643,7 +2640,7 @@
             <a:fld id="{53074F12-AA26-4AC8-9962-C36BB8F32554}" type="datetimeFigureOut">
               <a:rPr lang="en-US" smtClean="0"/>
               <a:pPr/>
-              <a:t>7/3/2025</a:t>
+              <a:t>7/4/2025</a:t>
             </a:fld>
             <a:endParaRPr lang="en-US"/>
           </a:p>
@@ -2920,7 +2917,7 @@
             <a:fld id="{53074F12-AA26-4AC8-9962-C36BB8F32554}" type="datetimeFigureOut">
               <a:rPr lang="en-US" smtClean="0"/>
               <a:pPr/>
-              <a:t>7/3/2025</a:t>
+              <a:t>7/4/2025</a:t>
             </a:fld>
             <a:endParaRPr lang="en-US"/>
           </a:p>
@@ -3142,7 +3139,7 @@
             <a:fld id="{53074F12-AA26-4AC8-9962-C36BB8F32554}" type="datetimeFigureOut">
               <a:rPr lang="en-US" smtClean="0"/>
               <a:pPr/>
-              <a:t>7/3/2025</a:t>
+              <a:t>7/4/2025</a:t>
             </a:fld>
             <a:endParaRPr lang="en-US"/>
           </a:p>
@@ -3573,7 +3570,23 @@
           <a:p>
             <a:r>
               <a:rPr lang="en-US" dirty="0"/>
-              <a:t>Click to edit Master subtitle style</a:t>
+              <a:t>Stockfish / </a:t>
+            </a:r>
+            <a:r>
+              <a:rPr lang="en-US" dirty="0" err="1"/>
+              <a:t>Implementierung</a:t>
+            </a:r>
+            <a:r>
+              <a:rPr lang="en-US" dirty="0"/>
+              <a:t> </a:t>
+            </a:r>
+            <a:r>
+              <a:rPr lang="en-US" dirty="0" err="1"/>
+              <a:t>eigener</a:t>
+            </a:r>
+            <a:r>
+              <a:rPr lang="en-US" dirty="0"/>
+              <a:t> Schach-KI</a:t>
             </a:r>
           </a:p>
         </p:txBody>
@@ -3592,216 +3605,6 @@
 </file>
 
 <file path=ppt/slides/slide10.xml><?xml version="1.0" encoding="utf-8"?>
-<p:sld xmlns:a="http://schemas.openxmlformats.org/drawingml/2006/main" xmlns:r="http://schemas.openxmlformats.org/officeDocument/2006/relationships" xmlns:p="http://schemas.openxmlformats.org/presentationml/2006/main">
-  <p:cSld>
-    <p:spTree>
-      <p:nvGrpSpPr>
-        <p:cNvPr id="1" name="">
-          <a:extLst>
-            <a:ext uri="{FF2B5EF4-FFF2-40B4-BE49-F238E27FC236}">
-              <a16:creationId xmlns:a16="http://schemas.microsoft.com/office/drawing/2014/main" id="{4DB52E04-B4E5-D3D7-7506-817A44BE3D7D}"/>
-            </a:ext>
-          </a:extLst>
-        </p:cNvPr>
-        <p:cNvGrpSpPr/>
-        <p:nvPr/>
-      </p:nvGrpSpPr>
-      <p:grpSpPr>
-        <a:xfrm>
-          <a:off x="0" y="0"/>
-          <a:ext cx="0" cy="0"/>
-          <a:chOff x="0" y="0"/>
-          <a:chExt cx="0" cy="0"/>
-        </a:xfrm>
-      </p:grpSpPr>
-      <p:sp>
-        <p:nvSpPr>
-          <p:cNvPr id="4" name="Title 3">
-            <a:extLst>
-              <a:ext uri="{FF2B5EF4-FFF2-40B4-BE49-F238E27FC236}">
-                <a16:creationId xmlns:a16="http://schemas.microsoft.com/office/drawing/2014/main" id="{C1FD3E07-4716-F462-B251-0DD0B5D48F33}"/>
-              </a:ext>
-            </a:extLst>
-          </p:cNvPr>
-          <p:cNvSpPr>
-            <a:spLocks noGrp="1"/>
-          </p:cNvSpPr>
-          <p:nvPr>
-            <p:ph type="title"/>
-          </p:nvPr>
-        </p:nvSpPr>
-        <p:spPr/>
-        <p:txBody>
-          <a:bodyPr/>
-          <a:lstStyle/>
-          <a:p>
-            <a:pPr algn="l"/>
-            <a:r>
-              <a:rPr lang="en-US" dirty="0" err="1">
-                <a:latin typeface="Arial" panose="020B0604020202020204" pitchFamily="34" charset="0"/>
-                <a:cs typeface="Arial" panose="020B0604020202020204" pitchFamily="34" charset="0"/>
-              </a:rPr>
-              <a:t>Spielfiguren-Unterscheidung</a:t>
-            </a:r>
-            <a:endParaRPr lang="en-US" dirty="0">
-              <a:latin typeface="Arial" panose="020B0604020202020204" pitchFamily="34" charset="0"/>
-              <a:cs typeface="Arial" panose="020B0604020202020204" pitchFamily="34" charset="0"/>
-            </a:endParaRPr>
-          </a:p>
-        </p:txBody>
-      </p:sp>
-      <p:sp>
-        <p:nvSpPr>
-          <p:cNvPr id="16" name="Content Placeholder 4">
-            <a:extLst>
-              <a:ext uri="{FF2B5EF4-FFF2-40B4-BE49-F238E27FC236}">
-                <a16:creationId xmlns:a16="http://schemas.microsoft.com/office/drawing/2014/main" id="{CA69A693-C4D8-1A59-5E53-BE2CA6B7B749}"/>
-              </a:ext>
-            </a:extLst>
-          </p:cNvPr>
-          <p:cNvSpPr>
-            <a:spLocks noGrp="1"/>
-          </p:cNvSpPr>
-          <p:nvPr>
-            <p:ph sz="half" idx="2"/>
-          </p:nvPr>
-        </p:nvSpPr>
-        <p:spPr>
-          <a:xfrm>
-            <a:off x="576395" y="2207360"/>
-            <a:ext cx="7352066" cy="4581150"/>
-          </a:xfrm>
-        </p:spPr>
-        <p:txBody>
-          <a:bodyPr>
-            <a:noAutofit/>
-          </a:bodyPr>
-          <a:lstStyle/>
-          <a:p>
-            <a:pPr marL="0" indent="0">
-              <a:buNone/>
-            </a:pPr>
-            <a:r>
-              <a:rPr lang="de-DE" sz="2800" dirty="0">
-                <a:latin typeface="Arial" panose="020B0604020202020204" pitchFamily="34" charset="0"/>
-                <a:cs typeface="Arial" panose="020B0604020202020204" pitchFamily="34" charset="0"/>
-              </a:rPr>
-              <a:t> Dynamische Zugberechnung (ineffizient):</a:t>
-            </a:r>
-          </a:p>
-          <a:p>
-            <a:r>
-              <a:rPr lang="de-DE" sz="2800" dirty="0">
-                <a:latin typeface="Arial" panose="020B0604020202020204" pitchFamily="34" charset="0"/>
-                <a:cs typeface="Arial" panose="020B0604020202020204" pitchFamily="34" charset="0"/>
-              </a:rPr>
-              <a:t>Schrittweises Iterieren in alle Richtungen</a:t>
-            </a:r>
-          </a:p>
-          <a:p>
-            <a:r>
-              <a:rPr lang="de-DE" sz="2800" dirty="0">
-                <a:latin typeface="Arial" panose="020B0604020202020204" pitchFamily="34" charset="0"/>
-                <a:cs typeface="Arial" panose="020B0604020202020204" pitchFamily="34" charset="0"/>
-              </a:rPr>
-              <a:t>Prüfung jedes Feldes auf Belegung</a:t>
-            </a:r>
-          </a:p>
-          <a:p>
-            <a:r>
-              <a:rPr lang="de-DE" sz="2800" dirty="0">
-                <a:latin typeface="Arial" panose="020B0604020202020204" pitchFamily="34" charset="0"/>
-                <a:cs typeface="Arial" panose="020B0604020202020204" pitchFamily="34" charset="0"/>
-              </a:rPr>
-              <a:t>Abbruch bei Blocker</a:t>
-            </a:r>
-          </a:p>
-          <a:p>
-            <a:r>
-              <a:rPr lang="de-DE" sz="2800" dirty="0">
-                <a:latin typeface="Arial" panose="020B0604020202020204" pitchFamily="34" charset="0"/>
-                <a:cs typeface="Arial" panose="020B0604020202020204" pitchFamily="34" charset="0"/>
-              </a:rPr>
-              <a:t>Nur gegnerische Figuren dürfen "mitgeschlagen" werden</a:t>
-            </a:r>
-          </a:p>
-          <a:p>
-            <a:pPr marL="0" indent="0">
-              <a:buNone/>
-            </a:pPr>
-            <a:r>
-              <a:rPr lang="de-DE" sz="2800" dirty="0">
-                <a:latin typeface="Arial" panose="020B0604020202020204" pitchFamily="34" charset="0"/>
-                <a:cs typeface="Arial" panose="020B0604020202020204" pitchFamily="34" charset="0"/>
-              </a:rPr>
-              <a:t> </a:t>
-            </a:r>
-            <a:r>
-              <a:rPr lang="de-DE" sz="2800" dirty="0">
-                <a:solidFill>
-                  <a:srgbClr val="FFFF00"/>
-                </a:solidFill>
-                <a:latin typeface="Arial" panose="020B0604020202020204" pitchFamily="34" charset="0"/>
-                <a:cs typeface="Arial" panose="020B0604020202020204" pitchFamily="34" charset="0"/>
-              </a:rPr>
-              <a:t>Optimierung durch:</a:t>
-            </a:r>
-          </a:p>
-          <a:p>
-            <a:r>
-              <a:rPr lang="de-DE" sz="2800" dirty="0">
-                <a:latin typeface="Arial" panose="020B0604020202020204" pitchFamily="34" charset="0"/>
-                <a:cs typeface="Arial" panose="020B0604020202020204" pitchFamily="34" charset="0"/>
-              </a:rPr>
-              <a:t>Magic Bitboards: ermöglichen schnelle Lookup-basierte Zugberechnung</a:t>
-            </a:r>
-          </a:p>
-        </p:txBody>
-      </p:sp>
-      <p:pic>
-        <p:nvPicPr>
-          <p:cNvPr id="3" name="Grafik 2">
-            <a:extLst>
-              <a:ext uri="{FF2B5EF4-FFF2-40B4-BE49-F238E27FC236}">
-                <a16:creationId xmlns:a16="http://schemas.microsoft.com/office/drawing/2014/main" id="{932ABA45-E7B4-FFA6-22D3-667760C40301}"/>
-              </a:ext>
-            </a:extLst>
-          </p:cNvPr>
-          <p:cNvPicPr>
-            <a:picLocks noChangeAspect="1"/>
-          </p:cNvPicPr>
-          <p:nvPr/>
-        </p:nvPicPr>
-        <p:blipFill>
-          <a:blip r:embed="rId2"/>
-          <a:stretch>
-            <a:fillRect/>
-          </a:stretch>
-        </p:blipFill>
-        <p:spPr>
-          <a:xfrm>
-            <a:off x="8081164" y="1749245"/>
-            <a:ext cx="3858265" cy="3851026"/>
-          </a:xfrm>
-          <a:prstGeom prst="rect">
-            <a:avLst/>
-          </a:prstGeom>
-        </p:spPr>
-      </p:pic>
-    </p:spTree>
-    <p:extLst>
-      <p:ext uri="{BB962C8B-B14F-4D97-AF65-F5344CB8AC3E}">
-        <p14:creationId xmlns:p14="http://schemas.microsoft.com/office/powerpoint/2010/main" val="2006584541"/>
-      </p:ext>
-    </p:extLst>
-  </p:cSld>
-  <p:clrMapOvr>
-    <a:masterClrMapping/>
-  </p:clrMapOvr>
-</p:sld>
-</file>
-
-<file path=ppt/slides/slide11.xml><?xml version="1.0" encoding="utf-8"?>
 <p:sld xmlns:a="http://schemas.openxmlformats.org/drawingml/2006/main" xmlns:r="http://schemas.openxmlformats.org/officeDocument/2006/relationships" xmlns:p="http://schemas.openxmlformats.org/presentationml/2006/main">
   <p:cSld>
     <p:spTree>
@@ -3896,10 +3699,13 @@
                 <a:latin typeface="Arial" panose="020B0604020202020204" pitchFamily="34" charset="0"/>
                 <a:cs typeface="Arial" panose="020B0604020202020204" pitchFamily="34" charset="0"/>
               </a:rPr>
-              <a:t> Schnelle Berechnung der Züge gleitender Figuren (Turm, Läufer, Dame)</a:t>
-            </a:r>
-          </a:p>
-          <a:p>
+              <a:t> Schnelles Lookup der Züge gleitender Figuren zu ermöglichen</a:t>
+            </a:r>
+          </a:p>
+          <a:p>
+            <a:pPr marL="0" indent="0">
+              <a:buNone/>
+            </a:pPr>
             <a:r>
               <a:rPr lang="de-DE" sz="2800" b="1" dirty="0">
                 <a:latin typeface="Arial" panose="020B0604020202020204" pitchFamily="34" charset="0"/>
@@ -3983,7 +3789,7 @@
 </p:sld>
 </file>
 
-<file path=ppt/slides/slide12.xml><?xml version="1.0" encoding="utf-8"?>
+<file path=ppt/slides/slide11.xml><?xml version="1.0" encoding="utf-8"?>
 <p:sld xmlns:a="http://schemas.openxmlformats.org/drawingml/2006/main" xmlns:r="http://schemas.openxmlformats.org/officeDocument/2006/relationships" xmlns:p="http://schemas.openxmlformats.org/presentationml/2006/main">
   <p:cSld>
     <p:spTree>
@@ -4151,7 +3957,7 @@
 </p:sld>
 </file>
 
-<file path=ppt/slides/slide13.xml><?xml version="1.0" encoding="utf-8"?>
+<file path=ppt/slides/slide12.xml><?xml version="1.0" encoding="utf-8"?>
 <p:sld xmlns:a="http://schemas.openxmlformats.org/drawingml/2006/main" xmlns:r="http://schemas.openxmlformats.org/officeDocument/2006/relationships" xmlns:p="http://schemas.openxmlformats.org/presentationml/2006/main">
   <p:cSld>
     <p:bg>
@@ -4591,7 +4397,7 @@
 </p:sld>
 </file>
 
-<file path=ppt/slides/slide14.xml><?xml version="1.0" encoding="utf-8"?>
+<file path=ppt/slides/slide13.xml><?xml version="1.0" encoding="utf-8"?>
 <p:sld xmlns:a="http://schemas.openxmlformats.org/drawingml/2006/main" xmlns:r="http://schemas.openxmlformats.org/officeDocument/2006/relationships" xmlns:p="http://schemas.openxmlformats.org/presentationml/2006/main">
   <p:cSld>
     <p:bg>
@@ -4979,189 +4785,7 @@
 </p:sld>
 </file>
 
-<file path=ppt/slides/slide15.xml><?xml version="1.0" encoding="utf-8"?>
-<p:sld xmlns:a="http://schemas.openxmlformats.org/drawingml/2006/main" xmlns:r="http://schemas.openxmlformats.org/officeDocument/2006/relationships" xmlns:p="http://schemas.openxmlformats.org/presentationml/2006/main">
-  <p:cSld>
-    <p:spTree>
-      <p:nvGrpSpPr>
-        <p:cNvPr id="1" name="">
-          <a:extLst>
-            <a:ext uri="{FF2B5EF4-FFF2-40B4-BE49-F238E27FC236}">
-              <a16:creationId xmlns:a16="http://schemas.microsoft.com/office/drawing/2014/main" id="{844F88A1-C5E2-0E9C-AF4E-5280DF60CA2A}"/>
-            </a:ext>
-          </a:extLst>
-        </p:cNvPr>
-        <p:cNvGrpSpPr/>
-        <p:nvPr/>
-      </p:nvGrpSpPr>
-      <p:grpSpPr>
-        <a:xfrm>
-          <a:off x="0" y="0"/>
-          <a:ext cx="0" cy="0"/>
-          <a:chOff x="0" y="0"/>
-          <a:chExt cx="0" cy="0"/>
-        </a:xfrm>
-      </p:grpSpPr>
-      <p:sp>
-        <p:nvSpPr>
-          <p:cNvPr id="4" name="Title 3">
-            <a:extLst>
-              <a:ext uri="{FF2B5EF4-FFF2-40B4-BE49-F238E27FC236}">
-                <a16:creationId xmlns:a16="http://schemas.microsoft.com/office/drawing/2014/main" id="{BA4E5AA7-9DDE-7231-3BB5-84BFB12389A7}"/>
-              </a:ext>
-            </a:extLst>
-          </p:cNvPr>
-          <p:cNvSpPr>
-            <a:spLocks noGrp="1"/>
-          </p:cNvSpPr>
-          <p:nvPr>
-            <p:ph type="title"/>
-          </p:nvPr>
-        </p:nvSpPr>
-        <p:spPr/>
-        <p:txBody>
-          <a:bodyPr/>
-          <a:lstStyle/>
-          <a:p>
-            <a:pPr algn="l"/>
-            <a:r>
-              <a:rPr lang="en-US" dirty="0">
-                <a:latin typeface="Arial" panose="020B0604020202020204" pitchFamily="34" charset="0"/>
-                <a:cs typeface="Arial" panose="020B0604020202020204" pitchFamily="34" charset="0"/>
-              </a:rPr>
-              <a:t>Magic-Bitboards</a:t>
-            </a:r>
-          </a:p>
-        </p:txBody>
-      </p:sp>
-      <p:sp>
-        <p:nvSpPr>
-          <p:cNvPr id="16" name="Content Placeholder 4">
-            <a:extLst>
-              <a:ext uri="{FF2B5EF4-FFF2-40B4-BE49-F238E27FC236}">
-                <a16:creationId xmlns:a16="http://schemas.microsoft.com/office/drawing/2014/main" id="{0C960CF7-319F-81CB-D905-1D398D8AA26F}"/>
-              </a:ext>
-            </a:extLst>
-          </p:cNvPr>
-          <p:cNvSpPr>
-            <a:spLocks noGrp="1"/>
-          </p:cNvSpPr>
-          <p:nvPr>
-            <p:ph sz="half" idx="2"/>
-          </p:nvPr>
-        </p:nvSpPr>
-        <p:spPr>
-          <a:xfrm>
-            <a:off x="598620" y="2054656"/>
-            <a:ext cx="8726411" cy="4581150"/>
-          </a:xfrm>
-        </p:spPr>
-        <p:txBody>
-          <a:bodyPr>
-            <a:noAutofit/>
-          </a:bodyPr>
-          <a:lstStyle/>
-          <a:p>
-            <a:r>
-              <a:rPr lang="de-DE" sz="2800" b="1" dirty="0">
-                <a:latin typeface="Arial" panose="020B0604020202020204" pitchFamily="34" charset="0"/>
-                <a:cs typeface="Arial" panose="020B0604020202020204" pitchFamily="34" charset="0"/>
-              </a:rPr>
-              <a:t>Ziel:</a:t>
-            </a:r>
-            <a:r>
-              <a:rPr lang="de-DE" sz="2800" dirty="0">
-                <a:latin typeface="Arial" panose="020B0604020202020204" pitchFamily="34" charset="0"/>
-                <a:cs typeface="Arial" panose="020B0604020202020204" pitchFamily="34" charset="0"/>
-              </a:rPr>
-              <a:t> Schnelle Berechnung der Züge gleitender Figuren (Turm, Läufer, Dame)</a:t>
-            </a:r>
-          </a:p>
-          <a:p>
-            <a:r>
-              <a:rPr lang="de-DE" sz="2800" b="1" dirty="0">
-                <a:latin typeface="Arial" panose="020B0604020202020204" pitchFamily="34" charset="0"/>
-                <a:cs typeface="Arial" panose="020B0604020202020204" pitchFamily="34" charset="0"/>
-              </a:rPr>
-              <a:t>Ansatz:</a:t>
-            </a:r>
-            <a:br>
-              <a:rPr lang="de-DE" sz="2800" dirty="0">
-                <a:latin typeface="Arial" panose="020B0604020202020204" pitchFamily="34" charset="0"/>
-                <a:cs typeface="Arial" panose="020B0604020202020204" pitchFamily="34" charset="0"/>
-              </a:rPr>
-            </a:br>
-            <a:r>
-              <a:rPr lang="de-DE" sz="2800" dirty="0">
-                <a:latin typeface="Arial" panose="020B0604020202020204" pitchFamily="34" charset="0"/>
-                <a:cs typeface="Arial" panose="020B0604020202020204" pitchFamily="34" charset="0"/>
-              </a:rPr>
-              <a:t>→ Alle Blocker-Konfigurationen vorab berechnen</a:t>
-            </a:r>
-            <a:br>
-              <a:rPr lang="de-DE" sz="2800" dirty="0">
-                <a:latin typeface="Arial" panose="020B0604020202020204" pitchFamily="34" charset="0"/>
-                <a:cs typeface="Arial" panose="020B0604020202020204" pitchFamily="34" charset="0"/>
-              </a:rPr>
-            </a:br>
-            <a:r>
-              <a:rPr lang="de-DE" sz="2800" dirty="0">
-                <a:latin typeface="Arial" panose="020B0604020202020204" pitchFamily="34" charset="0"/>
-                <a:cs typeface="Arial" panose="020B0604020202020204" pitchFamily="34" charset="0"/>
-              </a:rPr>
-              <a:t>→ Jeder Blocker-Zustand ergibt einen </a:t>
-            </a:r>
-            <a:r>
-              <a:rPr lang="de-DE" sz="2800" b="1" dirty="0">
-                <a:latin typeface="Arial" panose="020B0604020202020204" pitchFamily="34" charset="0"/>
-                <a:cs typeface="Arial" panose="020B0604020202020204" pitchFamily="34" charset="0"/>
-              </a:rPr>
-              <a:t>Index für eine Lookup-Tabelle</a:t>
-            </a:r>
-            <a:br>
-              <a:rPr lang="de-DE" sz="2800" dirty="0">
-                <a:latin typeface="Arial" panose="020B0604020202020204" pitchFamily="34" charset="0"/>
-                <a:cs typeface="Arial" panose="020B0604020202020204" pitchFamily="34" charset="0"/>
-              </a:rPr>
-            </a:br>
-            <a:r>
-              <a:rPr lang="de-DE" sz="2800" dirty="0">
-                <a:latin typeface="Arial" panose="020B0604020202020204" pitchFamily="34" charset="0"/>
-                <a:cs typeface="Arial" panose="020B0604020202020204" pitchFamily="34" charset="0"/>
-              </a:rPr>
-              <a:t>→ Tabelle liefert direkt das </a:t>
-            </a:r>
-            <a:r>
-              <a:rPr lang="de-DE" sz="2800" dirty="0" err="1">
-                <a:latin typeface="Arial" panose="020B0604020202020204" pitchFamily="34" charset="0"/>
-                <a:cs typeface="Arial" panose="020B0604020202020204" pitchFamily="34" charset="0"/>
-              </a:rPr>
-              <a:t>Bitboard</a:t>
-            </a:r>
-            <a:r>
-              <a:rPr lang="de-DE" sz="2800" dirty="0">
-                <a:latin typeface="Arial" panose="020B0604020202020204" pitchFamily="34" charset="0"/>
-                <a:cs typeface="Arial" panose="020B0604020202020204" pitchFamily="34" charset="0"/>
-              </a:rPr>
-              <a:t> mit legalen Zügen</a:t>
-            </a:r>
-          </a:p>
-        </p:txBody>
-      </p:sp>
-    </p:spTree>
-    <p:extLst>
-      <p:ext uri="{BB962C8B-B14F-4D97-AF65-F5344CB8AC3E}">
-        <p14:creationId xmlns:p14="http://schemas.microsoft.com/office/powerpoint/2010/main" val="1659818476"/>
-      </p:ext>
-    </p:extLst>
-  </p:cSld>
-  <p:clrMapOvr>
-    <a:masterClrMapping/>
-  </p:clrMapOvr>
-</p:sld>
-</file>
-
-<file path=ppt/slides/slide16.xml><?xml version="1.0" encoding="utf-8"?>
+<file path=ppt/slides/slide14.xml><?xml version="1.0" encoding="utf-8"?>
 <p:sld xmlns:a="http://schemas.openxmlformats.org/drawingml/2006/main" xmlns:r="http://schemas.openxmlformats.org/officeDocument/2006/relationships" xmlns:p="http://schemas.openxmlformats.org/presentationml/2006/main">
   <p:cSld>
     <p:spTree>
@@ -5208,10 +4832,13 @@
               </a:rPr>
               <a:t>Generierung</a:t>
             </a:r>
-            <a:endParaRPr lang="en-US" dirty="0">
-              <a:latin typeface="Arial" panose="020B0604020202020204" pitchFamily="34" charset="0"/>
-              <a:cs typeface="Arial" panose="020B0604020202020204" pitchFamily="34" charset="0"/>
-            </a:endParaRPr>
+            <a:r>
+              <a:rPr lang="en-US" dirty="0">
+                <a:latin typeface="Arial" panose="020B0604020202020204" pitchFamily="34" charset="0"/>
+                <a:cs typeface="Arial" panose="020B0604020202020204" pitchFamily="34" charset="0"/>
+              </a:rPr>
+              <a:t> - Stockfish</a:t>
+            </a:r>
           </a:p>
         </p:txBody>
       </p:sp>
@@ -5337,21 +4964,36 @@
                 <a:latin typeface="Arial" panose="020B0604020202020204" pitchFamily="34" charset="0"/>
                 <a:cs typeface="Arial" panose="020B0604020202020204" pitchFamily="34" charset="0"/>
               </a:rPr>
-              <a:t>: </a:t>
+              <a:t>: mittels </a:t>
             </a:r>
             <a:r>
               <a:rPr lang="de-DE" b="1" dirty="0">
                 <a:latin typeface="Arial" panose="020B0604020202020204" pitchFamily="34" charset="0"/>
                 <a:cs typeface="Arial" panose="020B0604020202020204" pitchFamily="34" charset="0"/>
               </a:rPr>
-              <a:t>Magic Bitboards</a:t>
+              <a:t>Magic Bitboards Index berechnen</a:t>
             </a:r>
             <a:r>
               <a:rPr lang="de-DE" dirty="0">
                 <a:latin typeface="Arial" panose="020B0604020202020204" pitchFamily="34" charset="0"/>
                 <a:cs typeface="Arial" panose="020B0604020202020204" pitchFamily="34" charset="0"/>
               </a:rPr>
-              <a:t> für effizientes Nachschlagen möglicher Züge</a:t>
+              <a:t> </a:t>
+            </a:r>
+            <a:r>
+              <a:rPr lang="de-DE" dirty="0">
+                <a:latin typeface="Cambria Math" panose="02040503050406030204" pitchFamily="18" charset="0"/>
+                <a:ea typeface="Cambria Math" panose="02040503050406030204" pitchFamily="18" charset="0"/>
+                <a:cs typeface="Arial" panose="020B0604020202020204" pitchFamily="34" charset="0"/>
+              </a:rPr>
+              <a:t>⟶</a:t>
+            </a:r>
+            <a:r>
+              <a:rPr lang="de-DE" dirty="0">
+                <a:latin typeface="Arial" panose="020B0604020202020204" pitchFamily="34" charset="0"/>
+                <a:cs typeface="Arial" panose="020B0604020202020204" pitchFamily="34" charset="0"/>
+              </a:rPr>
+              <a:t> ebenfalls Lookup</a:t>
             </a:r>
           </a:p>
           <a:p>
@@ -5375,7 +5017,7 @@
 </p:sld>
 </file>
 
-<file path=ppt/slides/slide17.xml><?xml version="1.0" encoding="utf-8"?>
+<file path=ppt/slides/slide15.xml><?xml version="1.0" encoding="utf-8"?>
 <p:sld xmlns:a="http://schemas.openxmlformats.org/drawingml/2006/main" xmlns:r="http://schemas.openxmlformats.org/officeDocument/2006/relationships" xmlns:p="http://schemas.openxmlformats.org/presentationml/2006/main">
   <p:cSld>
     <p:spTree>
@@ -6300,7 +5942,7 @@
 </p:sld>
 </file>
 
-<file path=ppt/slides/slide18.xml><?xml version="1.0" encoding="utf-8"?>
+<file path=ppt/slides/slide16.xml><?xml version="1.0" encoding="utf-8"?>
 <p:sld xmlns:a="http://schemas.openxmlformats.org/drawingml/2006/main" xmlns:r="http://schemas.openxmlformats.org/officeDocument/2006/relationships" xmlns:p="http://schemas.openxmlformats.org/presentationml/2006/main">
   <p:cSld>
     <p:spTree>
@@ -6566,7 +6208,7 @@
 </p:sld>
 </file>
 
-<file path=ppt/slides/slide19.xml><?xml version="1.0" encoding="utf-8"?>
+<file path=ppt/slides/slide17.xml><?xml version="1.0" encoding="utf-8"?>
 <p:sld xmlns:a="http://schemas.openxmlformats.org/drawingml/2006/main" xmlns:r="http://schemas.openxmlformats.org/officeDocument/2006/relationships" xmlns:p="http://schemas.openxmlformats.org/presentationml/2006/main">
   <p:cSld>
     <p:spTree>
@@ -6736,35 +6378,693 @@
               <a:t>Minimax durchsucht den Spielbaum bis zu einer festen Tiefe</a:t>
             </a:r>
           </a:p>
-          <a:p>
-            <a:r>
-              <a:rPr lang="de-DE" b="1" dirty="0">
-                <a:latin typeface="Arial" panose="020B0604020202020204" pitchFamily="34" charset="0"/>
-                <a:cs typeface="Arial" panose="020B0604020202020204" pitchFamily="34" charset="0"/>
-              </a:rPr>
-              <a:t>Alpha-Beta-</a:t>
-            </a:r>
-            <a:r>
-              <a:rPr lang="de-DE" b="1" dirty="0" err="1">
-                <a:latin typeface="Arial" panose="020B0604020202020204" pitchFamily="34" charset="0"/>
-                <a:cs typeface="Arial" panose="020B0604020202020204" pitchFamily="34" charset="0"/>
-              </a:rPr>
-              <a:t>Pruning</a:t>
-            </a:r>
-            <a:r>
-              <a:rPr lang="de-DE" dirty="0">
-                <a:latin typeface="Arial" panose="020B0604020202020204" pitchFamily="34" charset="0"/>
-                <a:cs typeface="Arial" panose="020B0604020202020204" pitchFamily="34" charset="0"/>
-              </a:rPr>
-              <a:t> schneidet unwichtige Zweige frühzeitig ab</a:t>
-            </a:r>
-          </a:p>
         </p:txBody>
       </p:sp>
     </p:spTree>
     <p:extLst>
       <p:ext uri="{BB962C8B-B14F-4D97-AF65-F5344CB8AC3E}">
         <p14:creationId xmlns:p14="http://schemas.microsoft.com/office/powerpoint/2010/main" val="1541493737"/>
+      </p:ext>
+    </p:extLst>
+  </p:cSld>
+  <p:clrMapOvr>
+    <a:masterClrMapping/>
+  </p:clrMapOvr>
+</p:sld>
+</file>
+
+<file path=ppt/slides/slide18.xml><?xml version="1.0" encoding="utf-8"?>
+<p:sld xmlns:a="http://schemas.openxmlformats.org/drawingml/2006/main" xmlns:r="http://schemas.openxmlformats.org/officeDocument/2006/relationships" xmlns:p="http://schemas.openxmlformats.org/presentationml/2006/main">
+  <p:cSld>
+    <p:spTree>
+      <p:nvGrpSpPr>
+        <p:cNvPr id="1" name="">
+          <a:extLst>
+            <a:ext uri="{FF2B5EF4-FFF2-40B4-BE49-F238E27FC236}">
+              <a16:creationId xmlns:a16="http://schemas.microsoft.com/office/drawing/2014/main" id="{AE1E3DA0-8033-5FF3-7845-4910F44D062A}"/>
+            </a:ext>
+          </a:extLst>
+        </p:cNvPr>
+        <p:cNvGrpSpPr/>
+        <p:nvPr/>
+      </p:nvGrpSpPr>
+      <p:grpSpPr>
+        <a:xfrm>
+          <a:off x="0" y="0"/>
+          <a:ext cx="0" cy="0"/>
+          <a:chOff x="0" y="0"/>
+          <a:chExt cx="0" cy="0"/>
+        </a:xfrm>
+      </p:grpSpPr>
+      <p:sp>
+        <p:nvSpPr>
+          <p:cNvPr id="4" name="Title 3">
+            <a:extLst>
+              <a:ext uri="{FF2B5EF4-FFF2-40B4-BE49-F238E27FC236}">
+                <a16:creationId xmlns:a16="http://schemas.microsoft.com/office/drawing/2014/main" id="{87AB7237-59EC-45CE-C0E6-7583F2E50D8B}"/>
+              </a:ext>
+            </a:extLst>
+          </p:cNvPr>
+          <p:cNvSpPr>
+            <a:spLocks noGrp="1"/>
+          </p:cNvSpPr>
+          <p:nvPr>
+            <p:ph type="title"/>
+          </p:nvPr>
+        </p:nvSpPr>
+        <p:spPr>
+          <a:xfrm>
+            <a:off x="445917" y="374900"/>
+            <a:ext cx="9354926" cy="1143001"/>
+          </a:xfrm>
+        </p:spPr>
+        <p:txBody>
+          <a:bodyPr>
+            <a:normAutofit/>
+          </a:bodyPr>
+          <a:lstStyle/>
+          <a:p>
+            <a:r>
+              <a:rPr lang="de-DE" sz="3200" dirty="0">
+                <a:latin typeface="Arial" panose="020B0604020202020204" pitchFamily="34" charset="0"/>
+                <a:cs typeface="Arial" panose="020B0604020202020204" pitchFamily="34" charset="0"/>
+              </a:rPr>
+              <a:t>Beispiel : Mini-Max-Algorithmus</a:t>
+            </a:r>
+            <a:endParaRPr lang="en-US" sz="3200" dirty="0">
+              <a:latin typeface="Arial" panose="020B0604020202020204" pitchFamily="34" charset="0"/>
+              <a:cs typeface="Arial" panose="020B0604020202020204" pitchFamily="34" charset="0"/>
+            </a:endParaRPr>
+          </a:p>
+        </p:txBody>
+      </p:sp>
+      <p:sp>
+        <p:nvSpPr>
+          <p:cNvPr id="5" name="Content Placeholder 4">
+            <a:extLst>
+              <a:ext uri="{FF2B5EF4-FFF2-40B4-BE49-F238E27FC236}">
+                <a16:creationId xmlns:a16="http://schemas.microsoft.com/office/drawing/2014/main" id="{5F05C1B9-F386-BF11-1FF3-2D9CD55FCBB3}"/>
+              </a:ext>
+            </a:extLst>
+          </p:cNvPr>
+          <p:cNvSpPr>
+            <a:spLocks noGrp="1"/>
+          </p:cNvSpPr>
+          <p:nvPr>
+            <p:ph idx="1"/>
+          </p:nvPr>
+        </p:nvSpPr>
+        <p:spPr>
+          <a:xfrm>
+            <a:off x="445916" y="1544097"/>
+            <a:ext cx="5553970" cy="4633593"/>
+          </a:xfrm>
+        </p:spPr>
+        <p:txBody>
+          <a:bodyPr>
+            <a:noAutofit/>
+          </a:bodyPr>
+          <a:lstStyle/>
+          <a:p>
+            <a:r>
+              <a:rPr lang="de-DE" sz="2201" dirty="0">
+                <a:latin typeface="Arial" panose="020B0604020202020204" pitchFamily="34" charset="0"/>
+                <a:cs typeface="Arial" panose="020B0604020202020204" pitchFamily="34" charset="0"/>
+              </a:rPr>
+              <a:t>Weiß (rund) sucht das Maximum</a:t>
+            </a:r>
+          </a:p>
+          <a:p>
+            <a:endParaRPr lang="de-DE" sz="2201" dirty="0">
+              <a:latin typeface="Arial" panose="020B0604020202020204" pitchFamily="34" charset="0"/>
+              <a:cs typeface="Arial" panose="020B0604020202020204" pitchFamily="34" charset="0"/>
+            </a:endParaRPr>
+          </a:p>
+          <a:p>
+            <a:r>
+              <a:rPr lang="de-DE" sz="2201" dirty="0">
+                <a:latin typeface="Arial" panose="020B0604020202020204" pitchFamily="34" charset="0"/>
+                <a:cs typeface="Arial" panose="020B0604020202020204" pitchFamily="34" charset="0"/>
+              </a:rPr>
+              <a:t>Zug mit +∞ wird in Tiefe 4 von Schwarz blockiert</a:t>
+            </a:r>
+          </a:p>
+          <a:p>
+            <a:endParaRPr lang="de-DE" sz="2201" dirty="0">
+              <a:latin typeface="Arial" panose="020B0604020202020204" pitchFamily="34" charset="0"/>
+              <a:cs typeface="Arial" panose="020B0604020202020204" pitchFamily="34" charset="0"/>
+            </a:endParaRPr>
+          </a:p>
+          <a:p>
+            <a:r>
+              <a:rPr lang="de-DE" sz="2201" dirty="0">
+                <a:latin typeface="Arial" panose="020B0604020202020204" pitchFamily="34" charset="0"/>
+                <a:cs typeface="Arial" panose="020B0604020202020204" pitchFamily="34" charset="0"/>
+              </a:rPr>
+              <a:t>Schwarz (eckig) wählt stattdessen Wert 10</a:t>
+            </a:r>
+          </a:p>
+          <a:p>
+            <a:endParaRPr lang="de-DE" sz="2201" dirty="0">
+              <a:latin typeface="Arial" panose="020B0604020202020204" pitchFamily="34" charset="0"/>
+              <a:cs typeface="Arial" panose="020B0604020202020204" pitchFamily="34" charset="0"/>
+            </a:endParaRPr>
+          </a:p>
+          <a:p>
+            <a:r>
+              <a:rPr lang="de-DE" sz="2201" dirty="0">
+                <a:latin typeface="Arial" panose="020B0604020202020204" pitchFamily="34" charset="0"/>
+                <a:cs typeface="Arial" panose="020B0604020202020204" pitchFamily="34" charset="0"/>
+              </a:rPr>
+              <a:t>Wert wird zur Wurzel rückpropagiert</a:t>
+            </a:r>
+          </a:p>
+          <a:p>
+            <a:endParaRPr lang="de-DE" sz="2201" dirty="0">
+              <a:latin typeface="Arial" panose="020B0604020202020204" pitchFamily="34" charset="0"/>
+              <a:cs typeface="Arial" panose="020B0604020202020204" pitchFamily="34" charset="0"/>
+            </a:endParaRPr>
+          </a:p>
+          <a:p>
+            <a:r>
+              <a:rPr lang="de-DE" sz="2201" dirty="0">
+                <a:latin typeface="Arial" panose="020B0604020202020204" pitchFamily="34" charset="0"/>
+                <a:cs typeface="Arial" panose="020B0604020202020204" pitchFamily="34" charset="0"/>
+              </a:rPr>
+              <a:t>Weiß entscheidet sich für −7 als bestmöglichen Zug</a:t>
+            </a:r>
+          </a:p>
+        </p:txBody>
+      </p:sp>
+      <p:pic>
+        <p:nvPicPr>
+          <p:cNvPr id="3" name="Grafik 2">
+            <a:extLst>
+              <a:ext uri="{FF2B5EF4-FFF2-40B4-BE49-F238E27FC236}">
+                <a16:creationId xmlns:a16="http://schemas.microsoft.com/office/drawing/2014/main" id="{E0D7BA35-4AA3-03BA-3D22-A3404C897E4A}"/>
+              </a:ext>
+            </a:extLst>
+          </p:cNvPr>
+          <p:cNvPicPr>
+            <a:picLocks noChangeAspect="1"/>
+          </p:cNvPicPr>
+          <p:nvPr/>
+        </p:nvPicPr>
+        <p:blipFill>
+          <a:blip r:embed="rId2"/>
+          <a:stretch>
+            <a:fillRect/>
+          </a:stretch>
+        </p:blipFill>
+        <p:spPr>
+          <a:xfrm>
+            <a:off x="5943296" y="2207361"/>
+            <a:ext cx="6192114" cy="2848373"/>
+          </a:xfrm>
+          <a:prstGeom prst="rect">
+            <a:avLst/>
+          </a:prstGeom>
+        </p:spPr>
+      </p:pic>
+    </p:spTree>
+    <p:extLst>
+      <p:ext uri="{BB962C8B-B14F-4D97-AF65-F5344CB8AC3E}">
+        <p14:creationId xmlns:p14="http://schemas.microsoft.com/office/powerpoint/2010/main" val="3610121507"/>
+      </p:ext>
+    </p:extLst>
+  </p:cSld>
+  <p:clrMapOvr>
+    <a:masterClrMapping/>
+  </p:clrMapOvr>
+</p:sld>
+</file>
+
+<file path=ppt/slides/slide19.xml><?xml version="1.0" encoding="utf-8"?>
+<p:sld xmlns:a="http://schemas.openxmlformats.org/drawingml/2006/main" xmlns:r="http://schemas.openxmlformats.org/officeDocument/2006/relationships" xmlns:p="http://schemas.openxmlformats.org/presentationml/2006/main">
+  <p:cSld>
+    <p:bg>
+      <p:bgPr>
+        <a:blipFill dpi="0" rotWithShape="1">
+          <a:blip r:embed="rId2">
+            <a:lum/>
+          </a:blip>
+          <a:srcRect/>
+          <a:stretch>
+            <a:fillRect/>
+          </a:stretch>
+        </a:blipFill>
+        <a:effectLst/>
+      </p:bgPr>
+    </p:bg>
+    <p:spTree>
+      <p:nvGrpSpPr>
+        <p:cNvPr id="1" name="">
+          <a:extLst>
+            <a:ext uri="{FF2B5EF4-FFF2-40B4-BE49-F238E27FC236}">
+              <a16:creationId xmlns:a16="http://schemas.microsoft.com/office/drawing/2014/main" id="{3DEA129B-AA8A-D8E9-5BAC-C0EBB14E7988}"/>
+            </a:ext>
+          </a:extLst>
+        </p:cNvPr>
+        <p:cNvGrpSpPr/>
+        <p:nvPr/>
+      </p:nvGrpSpPr>
+      <p:grpSpPr>
+        <a:xfrm>
+          <a:off x="0" y="0"/>
+          <a:ext cx="0" cy="0"/>
+          <a:chOff x="0" y="0"/>
+          <a:chExt cx="0" cy="0"/>
+        </a:xfrm>
+      </p:grpSpPr>
+      <p:sp>
+        <p:nvSpPr>
+          <p:cNvPr id="4" name="Title 3">
+            <a:extLst>
+              <a:ext uri="{FF2B5EF4-FFF2-40B4-BE49-F238E27FC236}">
+                <a16:creationId xmlns:a16="http://schemas.microsoft.com/office/drawing/2014/main" id="{43DD0380-D9F2-262C-DB5B-BBAAF535D239}"/>
+              </a:ext>
+            </a:extLst>
+          </p:cNvPr>
+          <p:cNvSpPr>
+            <a:spLocks noGrp="1"/>
+          </p:cNvSpPr>
+          <p:nvPr>
+            <p:ph type="title"/>
+          </p:nvPr>
+        </p:nvSpPr>
+        <p:spPr/>
+        <p:txBody>
+          <a:bodyPr/>
+          <a:lstStyle/>
+          <a:p>
+            <a:r>
+              <a:rPr lang="de-DE" dirty="0">
+                <a:latin typeface="Arial" panose="020B0604020202020204" pitchFamily="34" charset="0"/>
+                <a:cs typeface="Arial" panose="020B0604020202020204" pitchFamily="34" charset="0"/>
+              </a:rPr>
+              <a:t>Alpha-Beta-</a:t>
+            </a:r>
+            <a:r>
+              <a:rPr lang="de-DE" dirty="0" err="1">
+                <a:latin typeface="Arial" panose="020B0604020202020204" pitchFamily="34" charset="0"/>
+                <a:cs typeface="Arial" panose="020B0604020202020204" pitchFamily="34" charset="0"/>
+              </a:rPr>
+              <a:t>Pruning</a:t>
+            </a:r>
+            <a:endParaRPr lang="de-DE" dirty="0">
+              <a:latin typeface="Arial" panose="020B0604020202020204" pitchFamily="34" charset="0"/>
+              <a:cs typeface="Arial" panose="020B0604020202020204" pitchFamily="34" charset="0"/>
+            </a:endParaRPr>
+          </a:p>
+        </p:txBody>
+      </p:sp>
+      <p:sp>
+        <p:nvSpPr>
+          <p:cNvPr id="12" name="Content Placeholder 4">
+            <a:extLst>
+              <a:ext uri="{FF2B5EF4-FFF2-40B4-BE49-F238E27FC236}">
+                <a16:creationId xmlns:a16="http://schemas.microsoft.com/office/drawing/2014/main" id="{E1D3BAAC-E5CA-795C-3D9B-6A49A9D9E7F4}"/>
+              </a:ext>
+            </a:extLst>
+          </p:cNvPr>
+          <p:cNvSpPr txBox="1">
+            <a:spLocks/>
+          </p:cNvSpPr>
+          <p:nvPr/>
+        </p:nvSpPr>
+        <p:spPr>
+          <a:xfrm>
+            <a:off x="6887070" y="2937277"/>
+            <a:ext cx="649269" cy="491723"/>
+          </a:xfrm>
+          <a:prstGeom prst="rect">
+            <a:avLst/>
+          </a:prstGeom>
+        </p:spPr>
+        <p:txBody>
+          <a:bodyPr vert="horz" lIns="91440" tIns="45721" rIns="91440" bIns="45721" rtlCol="0">
+            <a:noAutofit/>
+          </a:bodyPr>
+          <a:lstStyle>
+            <a:lvl1pPr marL="342900" indent="-342900" algn="l" defTabSz="914400" rtl="0" eaLnBrk="1" latinLnBrk="0" hangingPunct="1">
+              <a:spcBef>
+                <a:spcPct val="20000"/>
+              </a:spcBef>
+              <a:buFont typeface="Arial" pitchFamily="34" charset="0"/>
+              <a:buChar char="•"/>
+              <a:defRPr sz="2800" kern="1200">
+                <a:solidFill>
+                  <a:schemeClr val="bg1"/>
+                </a:solidFill>
+                <a:latin typeface="+mn-lt"/>
+                <a:ea typeface="+mn-ea"/>
+                <a:cs typeface="+mn-cs"/>
+              </a:defRPr>
+            </a:lvl1pPr>
+            <a:lvl2pPr marL="742950" indent="-285750" algn="l" defTabSz="914400" rtl="0" eaLnBrk="1" latinLnBrk="0" hangingPunct="1">
+              <a:spcBef>
+                <a:spcPct val="20000"/>
+              </a:spcBef>
+              <a:buFont typeface="Arial" pitchFamily="34" charset="0"/>
+              <a:buChar char="–"/>
+              <a:defRPr sz="2800" kern="1200">
+                <a:solidFill>
+                  <a:schemeClr val="bg1"/>
+                </a:solidFill>
+                <a:latin typeface="+mn-lt"/>
+                <a:ea typeface="+mn-ea"/>
+                <a:cs typeface="+mn-cs"/>
+              </a:defRPr>
+            </a:lvl2pPr>
+            <a:lvl3pPr marL="1143000" indent="-228600" algn="l" defTabSz="914400" rtl="0" eaLnBrk="1" latinLnBrk="0" hangingPunct="1">
+              <a:spcBef>
+                <a:spcPct val="20000"/>
+              </a:spcBef>
+              <a:buFont typeface="Arial" pitchFamily="34" charset="0"/>
+              <a:buChar char="•"/>
+              <a:defRPr sz="2400" kern="1200">
+                <a:solidFill>
+                  <a:schemeClr val="bg1"/>
+                </a:solidFill>
+                <a:latin typeface="+mn-lt"/>
+                <a:ea typeface="+mn-ea"/>
+                <a:cs typeface="+mn-cs"/>
+              </a:defRPr>
+            </a:lvl3pPr>
+            <a:lvl4pPr marL="1600200" indent="-228600" algn="l" defTabSz="914400" rtl="0" eaLnBrk="1" latinLnBrk="0" hangingPunct="1">
+              <a:spcBef>
+                <a:spcPct val="20000"/>
+              </a:spcBef>
+              <a:buFont typeface="Arial" pitchFamily="34" charset="0"/>
+              <a:buChar char="–"/>
+              <a:defRPr sz="2000" kern="1200">
+                <a:solidFill>
+                  <a:schemeClr val="bg1"/>
+                </a:solidFill>
+                <a:latin typeface="+mn-lt"/>
+                <a:ea typeface="+mn-ea"/>
+                <a:cs typeface="+mn-cs"/>
+              </a:defRPr>
+            </a:lvl4pPr>
+            <a:lvl5pPr marL="2057400" indent="-228600" algn="l" defTabSz="914400" rtl="0" eaLnBrk="1" latinLnBrk="0" hangingPunct="1">
+              <a:spcBef>
+                <a:spcPct val="20000"/>
+              </a:spcBef>
+              <a:buFont typeface="Arial" pitchFamily="34" charset="0"/>
+              <a:buChar char="»"/>
+              <a:defRPr sz="2000" kern="1200">
+                <a:solidFill>
+                  <a:schemeClr val="bg1"/>
+                </a:solidFill>
+                <a:latin typeface="+mn-lt"/>
+                <a:ea typeface="+mn-ea"/>
+                <a:cs typeface="+mn-cs"/>
+              </a:defRPr>
+            </a:lvl5pPr>
+            <a:lvl6pPr marL="2514600" indent="-228600" algn="l" defTabSz="914400" rtl="0" eaLnBrk="1" latinLnBrk="0" hangingPunct="1">
+              <a:spcBef>
+                <a:spcPct val="20000"/>
+              </a:spcBef>
+              <a:buFont typeface="Arial" pitchFamily="34" charset="0"/>
+              <a:buChar char="•"/>
+              <a:defRPr sz="2000" kern="1200">
+                <a:solidFill>
+                  <a:schemeClr val="tx1"/>
+                </a:solidFill>
+                <a:latin typeface="+mn-lt"/>
+                <a:ea typeface="+mn-ea"/>
+                <a:cs typeface="+mn-cs"/>
+              </a:defRPr>
+            </a:lvl6pPr>
+            <a:lvl7pPr marL="2971800" indent="-228600" algn="l" defTabSz="914400" rtl="0" eaLnBrk="1" latinLnBrk="0" hangingPunct="1">
+              <a:spcBef>
+                <a:spcPct val="20000"/>
+              </a:spcBef>
+              <a:buFont typeface="Arial" pitchFamily="34" charset="0"/>
+              <a:buChar char="•"/>
+              <a:defRPr sz="2000" kern="1200">
+                <a:solidFill>
+                  <a:schemeClr val="tx1"/>
+                </a:solidFill>
+                <a:latin typeface="+mn-lt"/>
+                <a:ea typeface="+mn-ea"/>
+                <a:cs typeface="+mn-cs"/>
+              </a:defRPr>
+            </a:lvl7pPr>
+            <a:lvl8pPr marL="3429000" indent="-228600" algn="l" defTabSz="914400" rtl="0" eaLnBrk="1" latinLnBrk="0" hangingPunct="1">
+              <a:spcBef>
+                <a:spcPct val="20000"/>
+              </a:spcBef>
+              <a:buFont typeface="Arial" pitchFamily="34" charset="0"/>
+              <a:buChar char="•"/>
+              <a:defRPr sz="2000" kern="1200">
+                <a:solidFill>
+                  <a:schemeClr val="tx1"/>
+                </a:solidFill>
+                <a:latin typeface="+mn-lt"/>
+                <a:ea typeface="+mn-ea"/>
+                <a:cs typeface="+mn-cs"/>
+              </a:defRPr>
+            </a:lvl8pPr>
+            <a:lvl9pPr marL="3886200" indent="-228600" algn="l" defTabSz="914400" rtl="0" eaLnBrk="1" latinLnBrk="0" hangingPunct="1">
+              <a:spcBef>
+                <a:spcPct val="20000"/>
+              </a:spcBef>
+              <a:buFont typeface="Arial" pitchFamily="34" charset="0"/>
+              <a:buChar char="•"/>
+              <a:defRPr sz="2000" kern="1200">
+                <a:solidFill>
+                  <a:schemeClr val="tx1"/>
+                </a:solidFill>
+                <a:latin typeface="+mn-lt"/>
+                <a:ea typeface="+mn-ea"/>
+                <a:cs typeface="+mn-cs"/>
+              </a:defRPr>
+            </a:lvl9pPr>
+          </a:lstStyle>
+          <a:p>
+            <a:pPr marL="0" indent="0">
+              <a:buNone/>
+            </a:pPr>
+            <a:endParaRPr lang="de-DE" sz="7200" dirty="0"/>
+          </a:p>
+        </p:txBody>
+      </p:sp>
+      <p:sp>
+        <p:nvSpPr>
+          <p:cNvPr id="5" name="Inhaltsplatzhalter 4">
+            <a:extLst>
+              <a:ext uri="{FF2B5EF4-FFF2-40B4-BE49-F238E27FC236}">
+                <a16:creationId xmlns:a16="http://schemas.microsoft.com/office/drawing/2014/main" id="{B349E8F7-A4E3-9257-1B6C-34CC0242C554}"/>
+              </a:ext>
+            </a:extLst>
+          </p:cNvPr>
+          <p:cNvSpPr>
+            <a:spLocks noGrp="1"/>
+          </p:cNvSpPr>
+          <p:nvPr>
+            <p:ph idx="1"/>
+          </p:nvPr>
+        </p:nvSpPr>
+        <p:spPr>
+          <a:xfrm>
+            <a:off x="2534242" y="1596161"/>
+            <a:ext cx="9354926" cy="4275740"/>
+          </a:xfrm>
+        </p:spPr>
+        <p:txBody>
+          <a:bodyPr>
+            <a:noAutofit/>
+          </a:bodyPr>
+          <a:lstStyle/>
+          <a:p>
+            <a:r>
+              <a:rPr lang="de-DE" sz="2000" dirty="0">
+                <a:latin typeface="Arial" panose="020B0604020202020204" pitchFamily="34" charset="0"/>
+                <a:cs typeface="Arial" panose="020B0604020202020204" pitchFamily="34" charset="0"/>
+              </a:rPr>
+              <a:t>Optimierung des Mini-Max-Algorithmus zur </a:t>
+            </a:r>
+            <a:r>
+              <a:rPr lang="de-DE" sz="2000" b="1" dirty="0">
+                <a:latin typeface="Arial" panose="020B0604020202020204" pitchFamily="34" charset="0"/>
+                <a:cs typeface="Arial" panose="020B0604020202020204" pitchFamily="34" charset="0"/>
+              </a:rPr>
+              <a:t>Reduktion unnötiger Berechnungen</a:t>
+            </a:r>
+          </a:p>
+          <a:p>
+            <a:endParaRPr lang="de-DE" sz="2000" dirty="0">
+              <a:latin typeface="Arial" panose="020B0604020202020204" pitchFamily="34" charset="0"/>
+              <a:cs typeface="Arial" panose="020B0604020202020204" pitchFamily="34" charset="0"/>
+            </a:endParaRPr>
+          </a:p>
+          <a:p>
+            <a:r>
+              <a:rPr lang="de-DE" sz="2000" b="1" dirty="0">
+                <a:latin typeface="Arial" panose="020B0604020202020204" pitchFamily="34" charset="0"/>
+                <a:cs typeface="Arial" panose="020B0604020202020204" pitchFamily="34" charset="0"/>
+              </a:rPr>
+              <a:t>Ziel:</a:t>
+            </a:r>
+            <a:r>
+              <a:rPr lang="de-DE" sz="2000" dirty="0">
+                <a:latin typeface="Arial" panose="020B0604020202020204" pitchFamily="34" charset="0"/>
+                <a:cs typeface="Arial" panose="020B0604020202020204" pitchFamily="34" charset="0"/>
+              </a:rPr>
+              <a:t> Unvorteilhafte Teilbäume frühzeitig „abschneiden“</a:t>
+            </a:r>
+          </a:p>
+          <a:p>
+            <a:r>
+              <a:rPr lang="de-DE" sz="2000" b="1" dirty="0">
+                <a:latin typeface="Arial" panose="020B0604020202020204" pitchFamily="34" charset="0"/>
+                <a:cs typeface="Arial" panose="020B0604020202020204" pitchFamily="34" charset="0"/>
+              </a:rPr>
+              <a:t>Parameter:</a:t>
+            </a:r>
+          </a:p>
+          <a:p>
+            <a:r>
+              <a:rPr lang="el-GR" sz="2000" dirty="0">
+                <a:latin typeface="Arial" panose="020B0604020202020204" pitchFamily="34" charset="0"/>
+                <a:cs typeface="Arial" panose="020B0604020202020204" pitchFamily="34" charset="0"/>
+              </a:rPr>
+              <a:t>α=−∞: </a:t>
+            </a:r>
+            <a:r>
+              <a:rPr lang="de-DE" sz="2000" dirty="0">
+                <a:latin typeface="Arial" panose="020B0604020202020204" pitchFamily="34" charset="0"/>
+                <a:cs typeface="Arial" panose="020B0604020202020204" pitchFamily="34" charset="0"/>
+              </a:rPr>
+              <a:t>bester garantierter Wert für den </a:t>
+            </a:r>
+            <a:r>
+              <a:rPr lang="de-DE" sz="2000" b="1" dirty="0" err="1">
+                <a:latin typeface="Arial" panose="020B0604020202020204" pitchFamily="34" charset="0"/>
+                <a:cs typeface="Arial" panose="020B0604020202020204" pitchFamily="34" charset="0"/>
+              </a:rPr>
+              <a:t>Maximierer</a:t>
+            </a:r>
+            <a:endParaRPr lang="de-DE" sz="2000" dirty="0">
+              <a:latin typeface="Arial" panose="020B0604020202020204" pitchFamily="34" charset="0"/>
+              <a:cs typeface="Arial" panose="020B0604020202020204" pitchFamily="34" charset="0"/>
+            </a:endParaRPr>
+          </a:p>
+          <a:p>
+            <a:r>
+              <a:rPr lang="el-GR" sz="2000" dirty="0">
+                <a:latin typeface="Arial" panose="020B0604020202020204" pitchFamily="34" charset="0"/>
+                <a:cs typeface="Arial" panose="020B0604020202020204" pitchFamily="34" charset="0"/>
+              </a:rPr>
+              <a:t>β=+∞: </a:t>
+            </a:r>
+            <a:r>
+              <a:rPr lang="de-DE" sz="2000" dirty="0">
+                <a:latin typeface="Arial" panose="020B0604020202020204" pitchFamily="34" charset="0"/>
+                <a:cs typeface="Arial" panose="020B0604020202020204" pitchFamily="34" charset="0"/>
+              </a:rPr>
+              <a:t>schlechtester erlaubter Wert für den </a:t>
+            </a:r>
+            <a:r>
+              <a:rPr lang="de-DE" sz="2000" b="1" dirty="0" err="1">
+                <a:latin typeface="Arial" panose="020B0604020202020204" pitchFamily="34" charset="0"/>
+                <a:cs typeface="Arial" panose="020B0604020202020204" pitchFamily="34" charset="0"/>
+              </a:rPr>
+              <a:t>Minimierer</a:t>
+            </a:r>
+            <a:endParaRPr lang="de-DE" sz="2000" dirty="0">
+              <a:latin typeface="Arial" panose="020B0604020202020204" pitchFamily="34" charset="0"/>
+              <a:cs typeface="Arial" panose="020B0604020202020204" pitchFamily="34" charset="0"/>
+            </a:endParaRPr>
+          </a:p>
+          <a:p>
+            <a:endParaRPr lang="de-DE" sz="2000" b="1" dirty="0">
+              <a:latin typeface="Arial" panose="020B0604020202020204" pitchFamily="34" charset="0"/>
+              <a:cs typeface="Arial" panose="020B0604020202020204" pitchFamily="34" charset="0"/>
+            </a:endParaRPr>
+          </a:p>
+          <a:p>
+            <a:r>
+              <a:rPr lang="de-DE" sz="2000" b="1" dirty="0">
+                <a:latin typeface="Arial" panose="020B0604020202020204" pitchFamily="34" charset="0"/>
+                <a:cs typeface="Arial" panose="020B0604020202020204" pitchFamily="34" charset="0"/>
+              </a:rPr>
+              <a:t>Prinzip:</a:t>
+            </a:r>
+          </a:p>
+          <a:p>
+            <a:r>
+              <a:rPr lang="de-DE" sz="2000" dirty="0">
+                <a:latin typeface="Arial" panose="020B0604020202020204" pitchFamily="34" charset="0"/>
+                <a:cs typeface="Arial" panose="020B0604020202020204" pitchFamily="34" charset="0"/>
+              </a:rPr>
+              <a:t>Während der Suche wird </a:t>
+            </a:r>
+            <a:r>
+              <a:rPr lang="el-GR" sz="2000" dirty="0">
+                <a:latin typeface="Arial" panose="020B0604020202020204" pitchFamily="34" charset="0"/>
+                <a:cs typeface="Arial" panose="020B0604020202020204" pitchFamily="34" charset="0"/>
+              </a:rPr>
+              <a:t>α/β </a:t>
+            </a:r>
+            <a:r>
+              <a:rPr lang="de-DE" sz="2000" dirty="0">
+                <a:latin typeface="Arial" panose="020B0604020202020204" pitchFamily="34" charset="0"/>
+                <a:cs typeface="Arial" panose="020B0604020202020204" pitchFamily="34" charset="0"/>
+              </a:rPr>
+              <a:t>laufend aktualisiert</a:t>
+            </a:r>
+          </a:p>
+          <a:p>
+            <a:r>
+              <a:rPr lang="de-DE" sz="2000" b="1" dirty="0">
+                <a:latin typeface="Arial" panose="020B0604020202020204" pitchFamily="34" charset="0"/>
+                <a:cs typeface="Arial" panose="020B0604020202020204" pitchFamily="34" charset="0"/>
+              </a:rPr>
+              <a:t>Schnittbedingung:</a:t>
+            </a:r>
+            <a:r>
+              <a:rPr lang="de-DE" sz="2000" dirty="0">
+                <a:latin typeface="Arial" panose="020B0604020202020204" pitchFamily="34" charset="0"/>
+                <a:cs typeface="Arial" panose="020B0604020202020204" pitchFamily="34" charset="0"/>
+              </a:rPr>
+              <a:t> Sobald </a:t>
+            </a:r>
+            <a:r>
+              <a:rPr lang="el-GR" sz="2000" dirty="0">
+                <a:latin typeface="Arial" panose="020B0604020202020204" pitchFamily="34" charset="0"/>
+                <a:cs typeface="Arial" panose="020B0604020202020204" pitchFamily="34" charset="0"/>
+              </a:rPr>
+              <a:t>β≤α, </a:t>
+            </a:r>
+            <a:r>
+              <a:rPr lang="de-DE" sz="2000" dirty="0">
+                <a:latin typeface="Arial" panose="020B0604020202020204" pitchFamily="34" charset="0"/>
+                <a:cs typeface="Arial" panose="020B0604020202020204" pitchFamily="34" charset="0"/>
+              </a:rPr>
+              <a:t>wird der Teilbaum verworfen</a:t>
+            </a:r>
+            <a:br>
+              <a:rPr lang="de-DE" sz="2000" dirty="0">
+                <a:latin typeface="Arial" panose="020B0604020202020204" pitchFamily="34" charset="0"/>
+                <a:cs typeface="Arial" panose="020B0604020202020204" pitchFamily="34" charset="0"/>
+              </a:rPr>
+            </a:br>
+            <a:r>
+              <a:rPr lang="de-DE" sz="2000" dirty="0">
+                <a:latin typeface="Arial" panose="020B0604020202020204" pitchFamily="34" charset="0"/>
+                <a:cs typeface="Arial" panose="020B0604020202020204" pitchFamily="34" charset="0"/>
+              </a:rPr>
+              <a:t>→ keine bessere Lösung mehr möglich</a:t>
+            </a:r>
+          </a:p>
+        </p:txBody>
+      </p:sp>
+    </p:spTree>
+    <p:extLst>
+      <p:ext uri="{BB962C8B-B14F-4D97-AF65-F5344CB8AC3E}">
+        <p14:creationId xmlns:p14="http://schemas.microsoft.com/office/powerpoint/2010/main" val="2854285993"/>
       </p:ext>
     </p:extLst>
   </p:cSld>
@@ -7935,937 +8235,6 @@
 <file path=ppt/slides/slide20.xml><?xml version="1.0" encoding="utf-8"?>
 <p:sld xmlns:a="http://schemas.openxmlformats.org/drawingml/2006/main" xmlns:r="http://schemas.openxmlformats.org/officeDocument/2006/relationships" xmlns:p="http://schemas.openxmlformats.org/presentationml/2006/main">
   <p:cSld>
-    <p:spTree>
-      <p:nvGrpSpPr>
-        <p:cNvPr id="1" name="">
-          <a:extLst>
-            <a:ext uri="{FF2B5EF4-FFF2-40B4-BE49-F238E27FC236}">
-              <a16:creationId xmlns:a16="http://schemas.microsoft.com/office/drawing/2014/main" id="{7C3C51A1-928F-BECD-989F-04CBCEB5CDE9}"/>
-            </a:ext>
-          </a:extLst>
-        </p:cNvPr>
-        <p:cNvGrpSpPr/>
-        <p:nvPr/>
-      </p:nvGrpSpPr>
-      <p:grpSpPr>
-        <a:xfrm>
-          <a:off x="0" y="0"/>
-          <a:ext cx="0" cy="0"/>
-          <a:chOff x="0" y="0"/>
-          <a:chExt cx="0" cy="0"/>
-        </a:xfrm>
-      </p:grpSpPr>
-      <p:sp>
-        <p:nvSpPr>
-          <p:cNvPr id="4" name="Title 3">
-            <a:extLst>
-              <a:ext uri="{FF2B5EF4-FFF2-40B4-BE49-F238E27FC236}">
-                <a16:creationId xmlns:a16="http://schemas.microsoft.com/office/drawing/2014/main" id="{F77949CC-D2FF-7A43-A690-B8D83796856B}"/>
-              </a:ext>
-            </a:extLst>
-          </p:cNvPr>
-          <p:cNvSpPr>
-            <a:spLocks noGrp="1"/>
-          </p:cNvSpPr>
-          <p:nvPr>
-            <p:ph type="title"/>
-          </p:nvPr>
-        </p:nvSpPr>
-        <p:spPr>
-          <a:xfrm>
-            <a:off x="445917" y="374900"/>
-            <a:ext cx="9354926" cy="1143001"/>
-          </a:xfrm>
-        </p:spPr>
-        <p:txBody>
-          <a:bodyPr/>
-          <a:lstStyle/>
-          <a:p>
-            <a:r>
-              <a:rPr lang="de-DE" dirty="0">
-                <a:latin typeface="Arial" panose="020B0604020202020204" pitchFamily="34" charset="0"/>
-                <a:cs typeface="Arial" panose="020B0604020202020204" pitchFamily="34" charset="0"/>
-              </a:rPr>
-              <a:t>Mini-Max-Algorithmus</a:t>
-            </a:r>
-            <a:endParaRPr lang="en-US" dirty="0">
-              <a:latin typeface="Arial" panose="020B0604020202020204" pitchFamily="34" charset="0"/>
-              <a:cs typeface="Arial" panose="020B0604020202020204" pitchFamily="34" charset="0"/>
-            </a:endParaRPr>
-          </a:p>
-        </p:txBody>
-      </p:sp>
-      <p:sp>
-        <p:nvSpPr>
-          <p:cNvPr id="5" name="Content Placeholder 4">
-            <a:extLst>
-              <a:ext uri="{FF2B5EF4-FFF2-40B4-BE49-F238E27FC236}">
-                <a16:creationId xmlns:a16="http://schemas.microsoft.com/office/drawing/2014/main" id="{2ADD4A36-F8E2-DC12-7992-3E650E5381E6}"/>
-              </a:ext>
-            </a:extLst>
-          </p:cNvPr>
-          <p:cNvSpPr>
-            <a:spLocks noGrp="1"/>
-          </p:cNvSpPr>
-          <p:nvPr>
-            <p:ph idx="1"/>
-          </p:nvPr>
-        </p:nvSpPr>
-        <p:spPr>
-          <a:xfrm>
-            <a:off x="445916" y="1544097"/>
-            <a:ext cx="11746085" cy="4633593"/>
-          </a:xfrm>
-        </p:spPr>
-        <p:txBody>
-          <a:bodyPr>
-            <a:noAutofit/>
-          </a:bodyPr>
-          <a:lstStyle/>
-          <a:p>
-            <a:r>
-              <a:rPr lang="de-DE" b="1" dirty="0">
-                <a:latin typeface="Arial" panose="020B0604020202020204" pitchFamily="34" charset="0"/>
-                <a:cs typeface="Arial" panose="020B0604020202020204" pitchFamily="34" charset="0"/>
-              </a:rPr>
-              <a:t>Ziel:</a:t>
-            </a:r>
-          </a:p>
-          <a:p>
-            <a:r>
-              <a:rPr lang="de-DE" dirty="0">
-                <a:latin typeface="Arial" panose="020B0604020202020204" pitchFamily="34" charset="0"/>
-                <a:cs typeface="Arial" panose="020B0604020202020204" pitchFamily="34" charset="0"/>
-              </a:rPr>
-              <a:t>Nicht nur den besten eigenen Zug finden</a:t>
-            </a:r>
-          </a:p>
-          <a:p>
-            <a:r>
-              <a:rPr lang="de-DE" dirty="0">
-                <a:latin typeface="Arial" panose="020B0604020202020204" pitchFamily="34" charset="0"/>
-                <a:cs typeface="Arial" panose="020B0604020202020204" pitchFamily="34" charset="0"/>
-              </a:rPr>
-              <a:t>Sondern auch </a:t>
-            </a:r>
-            <a:r>
-              <a:rPr lang="de-DE" b="1" dirty="0">
-                <a:latin typeface="Arial" panose="020B0604020202020204" pitchFamily="34" charset="0"/>
-                <a:cs typeface="Arial" panose="020B0604020202020204" pitchFamily="34" charset="0"/>
-              </a:rPr>
-              <a:t>die besten gegnerischen Antworten minimieren</a:t>
-            </a:r>
-            <a:endParaRPr lang="de-DE" dirty="0">
-              <a:latin typeface="Arial" panose="020B0604020202020204" pitchFamily="34" charset="0"/>
-              <a:cs typeface="Arial" panose="020B0604020202020204" pitchFamily="34" charset="0"/>
-            </a:endParaRPr>
-          </a:p>
-          <a:p>
-            <a:pPr marL="0" indent="0">
-              <a:buNone/>
-            </a:pPr>
-            <a:endParaRPr lang="de-DE" b="1" dirty="0">
-              <a:latin typeface="Arial" panose="020B0604020202020204" pitchFamily="34" charset="0"/>
-              <a:cs typeface="Arial" panose="020B0604020202020204" pitchFamily="34" charset="0"/>
-            </a:endParaRPr>
-          </a:p>
-          <a:p>
-            <a:r>
-              <a:rPr lang="de-DE" dirty="0">
-                <a:latin typeface="Arial" panose="020B0604020202020204" pitchFamily="34" charset="0"/>
-                <a:cs typeface="Arial" panose="020B0604020202020204" pitchFamily="34" charset="0"/>
-              </a:rPr>
-              <a:t>Bewertungsscore &gt; 0 → Vorteil für Weiß</a:t>
-            </a:r>
-          </a:p>
-          <a:p>
-            <a:r>
-              <a:rPr lang="de-DE" dirty="0">
-                <a:latin typeface="Arial" panose="020B0604020202020204" pitchFamily="34" charset="0"/>
-                <a:cs typeface="Arial" panose="020B0604020202020204" pitchFamily="34" charset="0"/>
-              </a:rPr>
-              <a:t>Bewertungsscore &lt; 0 → Vorteil für Schwarz</a:t>
-            </a:r>
-          </a:p>
-          <a:p>
-            <a:endParaRPr lang="de-DE" dirty="0">
-              <a:latin typeface="Arial" panose="020B0604020202020204" pitchFamily="34" charset="0"/>
-              <a:cs typeface="Arial" panose="020B0604020202020204" pitchFamily="34" charset="0"/>
-            </a:endParaRPr>
-          </a:p>
-          <a:p>
-            <a:r>
-              <a:rPr lang="de-DE" dirty="0">
-                <a:latin typeface="Arial" panose="020B0604020202020204" pitchFamily="34" charset="0"/>
-                <a:cs typeface="Arial" panose="020B0604020202020204" pitchFamily="34" charset="0"/>
-              </a:rPr>
-              <a:t>Minimax durchsucht den Spielbaum bis zu einer festen Tiefe</a:t>
-            </a:r>
-          </a:p>
-          <a:p>
-            <a:r>
-              <a:rPr lang="de-DE" b="1" dirty="0">
-                <a:latin typeface="Arial" panose="020B0604020202020204" pitchFamily="34" charset="0"/>
-                <a:cs typeface="Arial" panose="020B0604020202020204" pitchFamily="34" charset="0"/>
-              </a:rPr>
-              <a:t>Alpha-Beta-</a:t>
-            </a:r>
-            <a:r>
-              <a:rPr lang="de-DE" b="1" dirty="0" err="1">
-                <a:latin typeface="Arial" panose="020B0604020202020204" pitchFamily="34" charset="0"/>
-                <a:cs typeface="Arial" panose="020B0604020202020204" pitchFamily="34" charset="0"/>
-              </a:rPr>
-              <a:t>Pruning</a:t>
-            </a:r>
-            <a:r>
-              <a:rPr lang="de-DE" dirty="0">
-                <a:latin typeface="Arial" panose="020B0604020202020204" pitchFamily="34" charset="0"/>
-                <a:cs typeface="Arial" panose="020B0604020202020204" pitchFamily="34" charset="0"/>
-              </a:rPr>
-              <a:t> schneidet unwichtige Zweige frühzeitig ab</a:t>
-            </a:r>
-          </a:p>
-        </p:txBody>
-      </p:sp>
-    </p:spTree>
-    <p:extLst>
-      <p:ext uri="{BB962C8B-B14F-4D97-AF65-F5344CB8AC3E}">
-        <p14:creationId xmlns:p14="http://schemas.microsoft.com/office/powerpoint/2010/main" val="1419615132"/>
-      </p:ext>
-    </p:extLst>
-  </p:cSld>
-  <p:clrMapOvr>
-    <a:masterClrMapping/>
-  </p:clrMapOvr>
-</p:sld>
-</file>
-
-<file path=ppt/slides/slide21.xml><?xml version="1.0" encoding="utf-8"?>
-<p:sld xmlns:a="http://schemas.openxmlformats.org/drawingml/2006/main" xmlns:r="http://schemas.openxmlformats.org/officeDocument/2006/relationships" xmlns:p="http://schemas.openxmlformats.org/presentationml/2006/main">
-  <p:cSld>
-    <p:spTree>
-      <p:nvGrpSpPr>
-        <p:cNvPr id="1" name="">
-          <a:extLst>
-            <a:ext uri="{FF2B5EF4-FFF2-40B4-BE49-F238E27FC236}">
-              <a16:creationId xmlns:a16="http://schemas.microsoft.com/office/drawing/2014/main" id="{AE1E3DA0-8033-5FF3-7845-4910F44D062A}"/>
-            </a:ext>
-          </a:extLst>
-        </p:cNvPr>
-        <p:cNvGrpSpPr/>
-        <p:nvPr/>
-      </p:nvGrpSpPr>
-      <p:grpSpPr>
-        <a:xfrm>
-          <a:off x="0" y="0"/>
-          <a:ext cx="0" cy="0"/>
-          <a:chOff x="0" y="0"/>
-          <a:chExt cx="0" cy="0"/>
-        </a:xfrm>
-      </p:grpSpPr>
-      <p:sp>
-        <p:nvSpPr>
-          <p:cNvPr id="4" name="Title 3">
-            <a:extLst>
-              <a:ext uri="{FF2B5EF4-FFF2-40B4-BE49-F238E27FC236}">
-                <a16:creationId xmlns:a16="http://schemas.microsoft.com/office/drawing/2014/main" id="{87AB7237-59EC-45CE-C0E6-7583F2E50D8B}"/>
-              </a:ext>
-            </a:extLst>
-          </p:cNvPr>
-          <p:cNvSpPr>
-            <a:spLocks noGrp="1"/>
-          </p:cNvSpPr>
-          <p:nvPr>
-            <p:ph type="title"/>
-          </p:nvPr>
-        </p:nvSpPr>
-        <p:spPr>
-          <a:xfrm>
-            <a:off x="445917" y="374900"/>
-            <a:ext cx="9354926" cy="1143001"/>
-          </a:xfrm>
-        </p:spPr>
-        <p:txBody>
-          <a:bodyPr>
-            <a:normAutofit/>
-          </a:bodyPr>
-          <a:lstStyle/>
-          <a:p>
-            <a:r>
-              <a:rPr lang="de-DE" sz="3200" dirty="0">
-                <a:latin typeface="Arial" panose="020B0604020202020204" pitchFamily="34" charset="0"/>
-                <a:cs typeface="Arial" panose="020B0604020202020204" pitchFamily="34" charset="0"/>
-              </a:rPr>
-              <a:t>Beispiel : Mini-Max-Algorithmus</a:t>
-            </a:r>
-            <a:endParaRPr lang="en-US" sz="3200" dirty="0">
-              <a:latin typeface="Arial" panose="020B0604020202020204" pitchFamily="34" charset="0"/>
-              <a:cs typeface="Arial" panose="020B0604020202020204" pitchFamily="34" charset="0"/>
-            </a:endParaRPr>
-          </a:p>
-        </p:txBody>
-      </p:sp>
-      <p:sp>
-        <p:nvSpPr>
-          <p:cNvPr id="5" name="Content Placeholder 4">
-            <a:extLst>
-              <a:ext uri="{FF2B5EF4-FFF2-40B4-BE49-F238E27FC236}">
-                <a16:creationId xmlns:a16="http://schemas.microsoft.com/office/drawing/2014/main" id="{5F05C1B9-F386-BF11-1FF3-2D9CD55FCBB3}"/>
-              </a:ext>
-            </a:extLst>
-          </p:cNvPr>
-          <p:cNvSpPr>
-            <a:spLocks noGrp="1"/>
-          </p:cNvSpPr>
-          <p:nvPr>
-            <p:ph idx="1"/>
-          </p:nvPr>
-        </p:nvSpPr>
-        <p:spPr>
-          <a:xfrm>
-            <a:off x="445916" y="1544097"/>
-            <a:ext cx="5553970" cy="4633593"/>
-          </a:xfrm>
-        </p:spPr>
-        <p:txBody>
-          <a:bodyPr>
-            <a:noAutofit/>
-          </a:bodyPr>
-          <a:lstStyle/>
-          <a:p>
-            <a:r>
-              <a:rPr lang="de-DE" sz="2201" dirty="0">
-                <a:latin typeface="Arial" panose="020B0604020202020204" pitchFamily="34" charset="0"/>
-                <a:cs typeface="Arial" panose="020B0604020202020204" pitchFamily="34" charset="0"/>
-              </a:rPr>
-              <a:t>Weiß (rund) sucht das Maximum</a:t>
-            </a:r>
-          </a:p>
-          <a:p>
-            <a:endParaRPr lang="de-DE" sz="2201" dirty="0">
-              <a:latin typeface="Arial" panose="020B0604020202020204" pitchFamily="34" charset="0"/>
-              <a:cs typeface="Arial" panose="020B0604020202020204" pitchFamily="34" charset="0"/>
-            </a:endParaRPr>
-          </a:p>
-          <a:p>
-            <a:r>
-              <a:rPr lang="de-DE" sz="2201" dirty="0">
-                <a:latin typeface="Arial" panose="020B0604020202020204" pitchFamily="34" charset="0"/>
-                <a:cs typeface="Arial" panose="020B0604020202020204" pitchFamily="34" charset="0"/>
-              </a:rPr>
-              <a:t>Zug mit +∞ wird in Tiefe 4 von Schwarz blockiert</a:t>
-            </a:r>
-          </a:p>
-          <a:p>
-            <a:endParaRPr lang="de-DE" sz="2201" dirty="0">
-              <a:latin typeface="Arial" panose="020B0604020202020204" pitchFamily="34" charset="0"/>
-              <a:cs typeface="Arial" panose="020B0604020202020204" pitchFamily="34" charset="0"/>
-            </a:endParaRPr>
-          </a:p>
-          <a:p>
-            <a:r>
-              <a:rPr lang="de-DE" sz="2201" dirty="0">
-                <a:latin typeface="Arial" panose="020B0604020202020204" pitchFamily="34" charset="0"/>
-                <a:cs typeface="Arial" panose="020B0604020202020204" pitchFamily="34" charset="0"/>
-              </a:rPr>
-              <a:t>Schwarz (eckig) wählt stattdessen Wert 10</a:t>
-            </a:r>
-          </a:p>
-          <a:p>
-            <a:endParaRPr lang="de-DE" sz="2201" dirty="0">
-              <a:latin typeface="Arial" panose="020B0604020202020204" pitchFamily="34" charset="0"/>
-              <a:cs typeface="Arial" panose="020B0604020202020204" pitchFamily="34" charset="0"/>
-            </a:endParaRPr>
-          </a:p>
-          <a:p>
-            <a:r>
-              <a:rPr lang="de-DE" sz="2201" dirty="0">
-                <a:latin typeface="Arial" panose="020B0604020202020204" pitchFamily="34" charset="0"/>
-                <a:cs typeface="Arial" panose="020B0604020202020204" pitchFamily="34" charset="0"/>
-              </a:rPr>
-              <a:t>Wert wird zur Wurzel rückpropagiert</a:t>
-            </a:r>
-          </a:p>
-          <a:p>
-            <a:endParaRPr lang="de-DE" sz="2201" dirty="0">
-              <a:latin typeface="Arial" panose="020B0604020202020204" pitchFamily="34" charset="0"/>
-              <a:cs typeface="Arial" panose="020B0604020202020204" pitchFamily="34" charset="0"/>
-            </a:endParaRPr>
-          </a:p>
-          <a:p>
-            <a:r>
-              <a:rPr lang="de-DE" sz="2201" dirty="0">
-                <a:latin typeface="Arial" panose="020B0604020202020204" pitchFamily="34" charset="0"/>
-                <a:cs typeface="Arial" panose="020B0604020202020204" pitchFamily="34" charset="0"/>
-              </a:rPr>
-              <a:t>Weiß entscheidet sich für −7 als bestmöglichen Zug</a:t>
-            </a:r>
-          </a:p>
-        </p:txBody>
-      </p:sp>
-      <p:pic>
-        <p:nvPicPr>
-          <p:cNvPr id="3" name="Grafik 2">
-            <a:extLst>
-              <a:ext uri="{FF2B5EF4-FFF2-40B4-BE49-F238E27FC236}">
-                <a16:creationId xmlns:a16="http://schemas.microsoft.com/office/drawing/2014/main" id="{E0D7BA35-4AA3-03BA-3D22-A3404C897E4A}"/>
-              </a:ext>
-            </a:extLst>
-          </p:cNvPr>
-          <p:cNvPicPr>
-            <a:picLocks noChangeAspect="1"/>
-          </p:cNvPicPr>
-          <p:nvPr/>
-        </p:nvPicPr>
-        <p:blipFill>
-          <a:blip r:embed="rId2"/>
-          <a:stretch>
-            <a:fillRect/>
-          </a:stretch>
-        </p:blipFill>
-        <p:spPr>
-          <a:xfrm>
-            <a:off x="5943296" y="2207361"/>
-            <a:ext cx="6192114" cy="2848373"/>
-          </a:xfrm>
-          <a:prstGeom prst="rect">
-            <a:avLst/>
-          </a:prstGeom>
-        </p:spPr>
-      </p:pic>
-    </p:spTree>
-    <p:extLst>
-      <p:ext uri="{BB962C8B-B14F-4D97-AF65-F5344CB8AC3E}">
-        <p14:creationId xmlns:p14="http://schemas.microsoft.com/office/powerpoint/2010/main" val="3610121507"/>
-      </p:ext>
-    </p:extLst>
-  </p:cSld>
-  <p:clrMapOvr>
-    <a:masterClrMapping/>
-  </p:clrMapOvr>
-</p:sld>
-</file>
-
-<file path=ppt/slides/slide22.xml><?xml version="1.0" encoding="utf-8"?>
-<p:sld xmlns:a="http://schemas.openxmlformats.org/drawingml/2006/main" xmlns:r="http://schemas.openxmlformats.org/officeDocument/2006/relationships" xmlns:p="http://schemas.openxmlformats.org/presentationml/2006/main">
-  <p:cSld>
-    <p:bg>
-      <p:bgPr>
-        <a:blipFill dpi="0" rotWithShape="1">
-          <a:blip r:embed="rId2">
-            <a:lum/>
-          </a:blip>
-          <a:srcRect/>
-          <a:stretch>
-            <a:fillRect/>
-          </a:stretch>
-        </a:blipFill>
-        <a:effectLst/>
-      </p:bgPr>
-    </p:bg>
-    <p:spTree>
-      <p:nvGrpSpPr>
-        <p:cNvPr id="1" name="">
-          <a:extLst>
-            <a:ext uri="{FF2B5EF4-FFF2-40B4-BE49-F238E27FC236}">
-              <a16:creationId xmlns:a16="http://schemas.microsoft.com/office/drawing/2014/main" id="{3DEA129B-AA8A-D8E9-5BAC-C0EBB14E7988}"/>
-            </a:ext>
-          </a:extLst>
-        </p:cNvPr>
-        <p:cNvGrpSpPr/>
-        <p:nvPr/>
-      </p:nvGrpSpPr>
-      <p:grpSpPr>
-        <a:xfrm>
-          <a:off x="0" y="0"/>
-          <a:ext cx="0" cy="0"/>
-          <a:chOff x="0" y="0"/>
-          <a:chExt cx="0" cy="0"/>
-        </a:xfrm>
-      </p:grpSpPr>
-      <p:sp>
-        <p:nvSpPr>
-          <p:cNvPr id="4" name="Title 3">
-            <a:extLst>
-              <a:ext uri="{FF2B5EF4-FFF2-40B4-BE49-F238E27FC236}">
-                <a16:creationId xmlns:a16="http://schemas.microsoft.com/office/drawing/2014/main" id="{43DD0380-D9F2-262C-DB5B-BBAAF535D239}"/>
-              </a:ext>
-            </a:extLst>
-          </p:cNvPr>
-          <p:cNvSpPr>
-            <a:spLocks noGrp="1"/>
-          </p:cNvSpPr>
-          <p:nvPr>
-            <p:ph type="title"/>
-          </p:nvPr>
-        </p:nvSpPr>
-        <p:spPr/>
-        <p:txBody>
-          <a:bodyPr/>
-          <a:lstStyle/>
-          <a:p>
-            <a:r>
-              <a:rPr lang="de-DE" dirty="0">
-                <a:latin typeface="Arial" panose="020B0604020202020204" pitchFamily="34" charset="0"/>
-                <a:cs typeface="Arial" panose="020B0604020202020204" pitchFamily="34" charset="0"/>
-              </a:rPr>
-              <a:t>Alpha-Beta-</a:t>
-            </a:r>
-            <a:r>
-              <a:rPr lang="de-DE" dirty="0" err="1">
-                <a:latin typeface="Arial" panose="020B0604020202020204" pitchFamily="34" charset="0"/>
-                <a:cs typeface="Arial" panose="020B0604020202020204" pitchFamily="34" charset="0"/>
-              </a:rPr>
-              <a:t>Pruning</a:t>
-            </a:r>
-            <a:endParaRPr lang="de-DE" dirty="0">
-              <a:latin typeface="Arial" panose="020B0604020202020204" pitchFamily="34" charset="0"/>
-              <a:cs typeface="Arial" panose="020B0604020202020204" pitchFamily="34" charset="0"/>
-            </a:endParaRPr>
-          </a:p>
-        </p:txBody>
-      </p:sp>
-      <p:sp>
-        <p:nvSpPr>
-          <p:cNvPr id="12" name="Content Placeholder 4">
-            <a:extLst>
-              <a:ext uri="{FF2B5EF4-FFF2-40B4-BE49-F238E27FC236}">
-                <a16:creationId xmlns:a16="http://schemas.microsoft.com/office/drawing/2014/main" id="{E1D3BAAC-E5CA-795C-3D9B-6A49A9D9E7F4}"/>
-              </a:ext>
-            </a:extLst>
-          </p:cNvPr>
-          <p:cNvSpPr txBox="1">
-            <a:spLocks/>
-          </p:cNvSpPr>
-          <p:nvPr/>
-        </p:nvSpPr>
-        <p:spPr>
-          <a:xfrm>
-            <a:off x="6887070" y="2937277"/>
-            <a:ext cx="649269" cy="491723"/>
-          </a:xfrm>
-          <a:prstGeom prst="rect">
-            <a:avLst/>
-          </a:prstGeom>
-        </p:spPr>
-        <p:txBody>
-          <a:bodyPr vert="horz" lIns="91440" tIns="45721" rIns="91440" bIns="45721" rtlCol="0">
-            <a:noAutofit/>
-          </a:bodyPr>
-          <a:lstStyle>
-            <a:lvl1pPr marL="342900" indent="-342900" algn="l" defTabSz="914400" rtl="0" eaLnBrk="1" latinLnBrk="0" hangingPunct="1">
-              <a:spcBef>
-                <a:spcPct val="20000"/>
-              </a:spcBef>
-              <a:buFont typeface="Arial" pitchFamily="34" charset="0"/>
-              <a:buChar char="•"/>
-              <a:defRPr sz="2800" kern="1200">
-                <a:solidFill>
-                  <a:schemeClr val="bg1"/>
-                </a:solidFill>
-                <a:latin typeface="+mn-lt"/>
-                <a:ea typeface="+mn-ea"/>
-                <a:cs typeface="+mn-cs"/>
-              </a:defRPr>
-            </a:lvl1pPr>
-            <a:lvl2pPr marL="742950" indent="-285750" algn="l" defTabSz="914400" rtl="0" eaLnBrk="1" latinLnBrk="0" hangingPunct="1">
-              <a:spcBef>
-                <a:spcPct val="20000"/>
-              </a:spcBef>
-              <a:buFont typeface="Arial" pitchFamily="34" charset="0"/>
-              <a:buChar char="–"/>
-              <a:defRPr sz="2800" kern="1200">
-                <a:solidFill>
-                  <a:schemeClr val="bg1"/>
-                </a:solidFill>
-                <a:latin typeface="+mn-lt"/>
-                <a:ea typeface="+mn-ea"/>
-                <a:cs typeface="+mn-cs"/>
-              </a:defRPr>
-            </a:lvl2pPr>
-            <a:lvl3pPr marL="1143000" indent="-228600" algn="l" defTabSz="914400" rtl="0" eaLnBrk="1" latinLnBrk="0" hangingPunct="1">
-              <a:spcBef>
-                <a:spcPct val="20000"/>
-              </a:spcBef>
-              <a:buFont typeface="Arial" pitchFamily="34" charset="0"/>
-              <a:buChar char="•"/>
-              <a:defRPr sz="2400" kern="1200">
-                <a:solidFill>
-                  <a:schemeClr val="bg1"/>
-                </a:solidFill>
-                <a:latin typeface="+mn-lt"/>
-                <a:ea typeface="+mn-ea"/>
-                <a:cs typeface="+mn-cs"/>
-              </a:defRPr>
-            </a:lvl3pPr>
-            <a:lvl4pPr marL="1600200" indent="-228600" algn="l" defTabSz="914400" rtl="0" eaLnBrk="1" latinLnBrk="0" hangingPunct="1">
-              <a:spcBef>
-                <a:spcPct val="20000"/>
-              </a:spcBef>
-              <a:buFont typeface="Arial" pitchFamily="34" charset="0"/>
-              <a:buChar char="–"/>
-              <a:defRPr sz="2000" kern="1200">
-                <a:solidFill>
-                  <a:schemeClr val="bg1"/>
-                </a:solidFill>
-                <a:latin typeface="+mn-lt"/>
-                <a:ea typeface="+mn-ea"/>
-                <a:cs typeface="+mn-cs"/>
-              </a:defRPr>
-            </a:lvl4pPr>
-            <a:lvl5pPr marL="2057400" indent="-228600" algn="l" defTabSz="914400" rtl="0" eaLnBrk="1" latinLnBrk="0" hangingPunct="1">
-              <a:spcBef>
-                <a:spcPct val="20000"/>
-              </a:spcBef>
-              <a:buFont typeface="Arial" pitchFamily="34" charset="0"/>
-              <a:buChar char="»"/>
-              <a:defRPr sz="2000" kern="1200">
-                <a:solidFill>
-                  <a:schemeClr val="bg1"/>
-                </a:solidFill>
-                <a:latin typeface="+mn-lt"/>
-                <a:ea typeface="+mn-ea"/>
-                <a:cs typeface="+mn-cs"/>
-              </a:defRPr>
-            </a:lvl5pPr>
-            <a:lvl6pPr marL="2514600" indent="-228600" algn="l" defTabSz="914400" rtl="0" eaLnBrk="1" latinLnBrk="0" hangingPunct="1">
-              <a:spcBef>
-                <a:spcPct val="20000"/>
-              </a:spcBef>
-              <a:buFont typeface="Arial" pitchFamily="34" charset="0"/>
-              <a:buChar char="•"/>
-              <a:defRPr sz="2000" kern="1200">
-                <a:solidFill>
-                  <a:schemeClr val="tx1"/>
-                </a:solidFill>
-                <a:latin typeface="+mn-lt"/>
-                <a:ea typeface="+mn-ea"/>
-                <a:cs typeface="+mn-cs"/>
-              </a:defRPr>
-            </a:lvl6pPr>
-            <a:lvl7pPr marL="2971800" indent="-228600" algn="l" defTabSz="914400" rtl="0" eaLnBrk="1" latinLnBrk="0" hangingPunct="1">
-              <a:spcBef>
-                <a:spcPct val="20000"/>
-              </a:spcBef>
-              <a:buFont typeface="Arial" pitchFamily="34" charset="0"/>
-              <a:buChar char="•"/>
-              <a:defRPr sz="2000" kern="1200">
-                <a:solidFill>
-                  <a:schemeClr val="tx1"/>
-                </a:solidFill>
-                <a:latin typeface="+mn-lt"/>
-                <a:ea typeface="+mn-ea"/>
-                <a:cs typeface="+mn-cs"/>
-              </a:defRPr>
-            </a:lvl7pPr>
-            <a:lvl8pPr marL="3429000" indent="-228600" algn="l" defTabSz="914400" rtl="0" eaLnBrk="1" latinLnBrk="0" hangingPunct="1">
-              <a:spcBef>
-                <a:spcPct val="20000"/>
-              </a:spcBef>
-              <a:buFont typeface="Arial" pitchFamily="34" charset="0"/>
-              <a:buChar char="•"/>
-              <a:defRPr sz="2000" kern="1200">
-                <a:solidFill>
-                  <a:schemeClr val="tx1"/>
-                </a:solidFill>
-                <a:latin typeface="+mn-lt"/>
-                <a:ea typeface="+mn-ea"/>
-                <a:cs typeface="+mn-cs"/>
-              </a:defRPr>
-            </a:lvl8pPr>
-            <a:lvl9pPr marL="3886200" indent="-228600" algn="l" defTabSz="914400" rtl="0" eaLnBrk="1" latinLnBrk="0" hangingPunct="1">
-              <a:spcBef>
-                <a:spcPct val="20000"/>
-              </a:spcBef>
-              <a:buFont typeface="Arial" pitchFamily="34" charset="0"/>
-              <a:buChar char="•"/>
-              <a:defRPr sz="2000" kern="1200">
-                <a:solidFill>
-                  <a:schemeClr val="tx1"/>
-                </a:solidFill>
-                <a:latin typeface="+mn-lt"/>
-                <a:ea typeface="+mn-ea"/>
-                <a:cs typeface="+mn-cs"/>
-              </a:defRPr>
-            </a:lvl9pPr>
-          </a:lstStyle>
-          <a:p>
-            <a:pPr marL="0" indent="0">
-              <a:buNone/>
-            </a:pPr>
-            <a:endParaRPr lang="de-DE" sz="7200" dirty="0"/>
-          </a:p>
-        </p:txBody>
-      </p:sp>
-      <p:sp>
-        <p:nvSpPr>
-          <p:cNvPr id="5" name="Inhaltsplatzhalter 4">
-            <a:extLst>
-              <a:ext uri="{FF2B5EF4-FFF2-40B4-BE49-F238E27FC236}">
-                <a16:creationId xmlns:a16="http://schemas.microsoft.com/office/drawing/2014/main" id="{B349E8F7-A4E3-9257-1B6C-34CC0242C554}"/>
-              </a:ext>
-            </a:extLst>
-          </p:cNvPr>
-          <p:cNvSpPr>
-            <a:spLocks noGrp="1"/>
-          </p:cNvSpPr>
-          <p:nvPr>
-            <p:ph idx="1"/>
-          </p:nvPr>
-        </p:nvSpPr>
-        <p:spPr>
-          <a:xfrm>
-            <a:off x="2534242" y="1596161"/>
-            <a:ext cx="9354926" cy="4275740"/>
-          </a:xfrm>
-        </p:spPr>
-        <p:txBody>
-          <a:bodyPr>
-            <a:noAutofit/>
-          </a:bodyPr>
-          <a:lstStyle/>
-          <a:p>
-            <a:r>
-              <a:rPr lang="de-DE" sz="2000" dirty="0">
-                <a:latin typeface="Arial" panose="020B0604020202020204" pitchFamily="34" charset="0"/>
-                <a:cs typeface="Arial" panose="020B0604020202020204" pitchFamily="34" charset="0"/>
-              </a:rPr>
-              <a:t>Optimierung des Mini-Max-Algorithmus zur </a:t>
-            </a:r>
-            <a:r>
-              <a:rPr lang="de-DE" sz="2000" b="1" dirty="0">
-                <a:latin typeface="Arial" panose="020B0604020202020204" pitchFamily="34" charset="0"/>
-                <a:cs typeface="Arial" panose="020B0604020202020204" pitchFamily="34" charset="0"/>
-              </a:rPr>
-              <a:t>Reduktion unnötiger Berechnungen</a:t>
-            </a:r>
-          </a:p>
-          <a:p>
-            <a:endParaRPr lang="de-DE" sz="2000" dirty="0">
-              <a:latin typeface="Arial" panose="020B0604020202020204" pitchFamily="34" charset="0"/>
-              <a:cs typeface="Arial" panose="020B0604020202020204" pitchFamily="34" charset="0"/>
-            </a:endParaRPr>
-          </a:p>
-          <a:p>
-            <a:r>
-              <a:rPr lang="de-DE" sz="2000" b="1" dirty="0">
-                <a:latin typeface="Arial" panose="020B0604020202020204" pitchFamily="34" charset="0"/>
-                <a:cs typeface="Arial" panose="020B0604020202020204" pitchFamily="34" charset="0"/>
-              </a:rPr>
-              <a:t>Ziel:</a:t>
-            </a:r>
-            <a:r>
-              <a:rPr lang="de-DE" sz="2000" dirty="0">
-                <a:latin typeface="Arial" panose="020B0604020202020204" pitchFamily="34" charset="0"/>
-                <a:cs typeface="Arial" panose="020B0604020202020204" pitchFamily="34" charset="0"/>
-              </a:rPr>
-              <a:t> Unvorteilhafte Teilbäume frühzeitig „abschneiden“</a:t>
-            </a:r>
-          </a:p>
-          <a:p>
-            <a:r>
-              <a:rPr lang="de-DE" sz="2000" b="1" dirty="0">
-                <a:latin typeface="Arial" panose="020B0604020202020204" pitchFamily="34" charset="0"/>
-                <a:cs typeface="Arial" panose="020B0604020202020204" pitchFamily="34" charset="0"/>
-              </a:rPr>
-              <a:t>Parameter:</a:t>
-            </a:r>
-          </a:p>
-          <a:p>
-            <a:r>
-              <a:rPr lang="el-GR" sz="2000" dirty="0">
-                <a:latin typeface="Arial" panose="020B0604020202020204" pitchFamily="34" charset="0"/>
-                <a:cs typeface="Arial" panose="020B0604020202020204" pitchFamily="34" charset="0"/>
-              </a:rPr>
-              <a:t>α=−∞: </a:t>
-            </a:r>
-            <a:r>
-              <a:rPr lang="de-DE" sz="2000" dirty="0">
-                <a:latin typeface="Arial" panose="020B0604020202020204" pitchFamily="34" charset="0"/>
-                <a:cs typeface="Arial" panose="020B0604020202020204" pitchFamily="34" charset="0"/>
-              </a:rPr>
-              <a:t>bester garantierter Wert für den </a:t>
-            </a:r>
-            <a:r>
-              <a:rPr lang="de-DE" sz="2000" b="1" dirty="0" err="1">
-                <a:latin typeface="Arial" panose="020B0604020202020204" pitchFamily="34" charset="0"/>
-                <a:cs typeface="Arial" panose="020B0604020202020204" pitchFamily="34" charset="0"/>
-              </a:rPr>
-              <a:t>Maximierer</a:t>
-            </a:r>
-            <a:endParaRPr lang="de-DE" sz="2000" dirty="0">
-              <a:latin typeface="Arial" panose="020B0604020202020204" pitchFamily="34" charset="0"/>
-              <a:cs typeface="Arial" panose="020B0604020202020204" pitchFamily="34" charset="0"/>
-            </a:endParaRPr>
-          </a:p>
-          <a:p>
-            <a:r>
-              <a:rPr lang="el-GR" sz="2000" dirty="0">
-                <a:latin typeface="Arial" panose="020B0604020202020204" pitchFamily="34" charset="0"/>
-                <a:cs typeface="Arial" panose="020B0604020202020204" pitchFamily="34" charset="0"/>
-              </a:rPr>
-              <a:t>β=+∞: </a:t>
-            </a:r>
-            <a:r>
-              <a:rPr lang="de-DE" sz="2000" dirty="0">
-                <a:latin typeface="Arial" panose="020B0604020202020204" pitchFamily="34" charset="0"/>
-                <a:cs typeface="Arial" panose="020B0604020202020204" pitchFamily="34" charset="0"/>
-              </a:rPr>
-              <a:t>schlechtester erlaubter Wert für den </a:t>
-            </a:r>
-            <a:r>
-              <a:rPr lang="de-DE" sz="2000" b="1" dirty="0" err="1">
-                <a:latin typeface="Arial" panose="020B0604020202020204" pitchFamily="34" charset="0"/>
-                <a:cs typeface="Arial" panose="020B0604020202020204" pitchFamily="34" charset="0"/>
-              </a:rPr>
-              <a:t>Minimierer</a:t>
-            </a:r>
-            <a:endParaRPr lang="de-DE" sz="2000" dirty="0">
-              <a:latin typeface="Arial" panose="020B0604020202020204" pitchFamily="34" charset="0"/>
-              <a:cs typeface="Arial" panose="020B0604020202020204" pitchFamily="34" charset="0"/>
-            </a:endParaRPr>
-          </a:p>
-          <a:p>
-            <a:endParaRPr lang="de-DE" sz="2000" b="1" dirty="0">
-              <a:latin typeface="Arial" panose="020B0604020202020204" pitchFamily="34" charset="0"/>
-              <a:cs typeface="Arial" panose="020B0604020202020204" pitchFamily="34" charset="0"/>
-            </a:endParaRPr>
-          </a:p>
-          <a:p>
-            <a:r>
-              <a:rPr lang="de-DE" sz="2000" b="1" dirty="0">
-                <a:latin typeface="Arial" panose="020B0604020202020204" pitchFamily="34" charset="0"/>
-                <a:cs typeface="Arial" panose="020B0604020202020204" pitchFamily="34" charset="0"/>
-              </a:rPr>
-              <a:t>Prinzip:</a:t>
-            </a:r>
-          </a:p>
-          <a:p>
-            <a:r>
-              <a:rPr lang="de-DE" sz="2000" dirty="0">
-                <a:latin typeface="Arial" panose="020B0604020202020204" pitchFamily="34" charset="0"/>
-                <a:cs typeface="Arial" panose="020B0604020202020204" pitchFamily="34" charset="0"/>
-              </a:rPr>
-              <a:t>Während der Suche wird </a:t>
-            </a:r>
-            <a:r>
-              <a:rPr lang="el-GR" sz="2000" dirty="0">
-                <a:latin typeface="Arial" panose="020B0604020202020204" pitchFamily="34" charset="0"/>
-                <a:cs typeface="Arial" panose="020B0604020202020204" pitchFamily="34" charset="0"/>
-              </a:rPr>
-              <a:t>α/β </a:t>
-            </a:r>
-            <a:r>
-              <a:rPr lang="de-DE" sz="2000" dirty="0">
-                <a:latin typeface="Arial" panose="020B0604020202020204" pitchFamily="34" charset="0"/>
-                <a:cs typeface="Arial" panose="020B0604020202020204" pitchFamily="34" charset="0"/>
-              </a:rPr>
-              <a:t>laufend aktualisiert</a:t>
-            </a:r>
-          </a:p>
-          <a:p>
-            <a:r>
-              <a:rPr lang="de-DE" sz="2000" b="1" dirty="0">
-                <a:latin typeface="Arial" panose="020B0604020202020204" pitchFamily="34" charset="0"/>
-                <a:cs typeface="Arial" panose="020B0604020202020204" pitchFamily="34" charset="0"/>
-              </a:rPr>
-              <a:t>Schnittbedingung:</a:t>
-            </a:r>
-            <a:r>
-              <a:rPr lang="de-DE" sz="2000" dirty="0">
-                <a:latin typeface="Arial" panose="020B0604020202020204" pitchFamily="34" charset="0"/>
-                <a:cs typeface="Arial" panose="020B0604020202020204" pitchFamily="34" charset="0"/>
-              </a:rPr>
-              <a:t> Sobald </a:t>
-            </a:r>
-            <a:r>
-              <a:rPr lang="el-GR" sz="2000" dirty="0">
-                <a:latin typeface="Arial" panose="020B0604020202020204" pitchFamily="34" charset="0"/>
-                <a:cs typeface="Arial" panose="020B0604020202020204" pitchFamily="34" charset="0"/>
-              </a:rPr>
-              <a:t>β≤α\</a:t>
-            </a:r>
-            <a:r>
-              <a:rPr lang="de-DE" sz="2000" dirty="0" err="1">
-                <a:latin typeface="Arial" panose="020B0604020202020204" pitchFamily="34" charset="0"/>
-                <a:cs typeface="Arial" panose="020B0604020202020204" pitchFamily="34" charset="0"/>
-              </a:rPr>
-              <a:t>beta</a:t>
-            </a:r>
-            <a:r>
-              <a:rPr lang="de-DE" sz="2000" dirty="0">
-                <a:latin typeface="Arial" panose="020B0604020202020204" pitchFamily="34" charset="0"/>
-                <a:cs typeface="Arial" panose="020B0604020202020204" pitchFamily="34" charset="0"/>
-              </a:rPr>
-              <a:t> \</a:t>
-            </a:r>
-            <a:r>
-              <a:rPr lang="de-DE" sz="2000" dirty="0" err="1">
-                <a:latin typeface="Arial" panose="020B0604020202020204" pitchFamily="34" charset="0"/>
-                <a:cs typeface="Arial" panose="020B0604020202020204" pitchFamily="34" charset="0"/>
-              </a:rPr>
-              <a:t>leq</a:t>
-            </a:r>
-            <a:r>
-              <a:rPr lang="de-DE" sz="2000" dirty="0">
-                <a:latin typeface="Arial" panose="020B0604020202020204" pitchFamily="34" charset="0"/>
-                <a:cs typeface="Arial" panose="020B0604020202020204" pitchFamily="34" charset="0"/>
-              </a:rPr>
-              <a:t> \</a:t>
-            </a:r>
-            <a:r>
-              <a:rPr lang="de-DE" sz="2000" dirty="0" err="1">
-                <a:latin typeface="Arial" panose="020B0604020202020204" pitchFamily="34" charset="0"/>
-                <a:cs typeface="Arial" panose="020B0604020202020204" pitchFamily="34" charset="0"/>
-              </a:rPr>
-              <a:t>alpha</a:t>
-            </a:r>
-            <a:r>
-              <a:rPr lang="el-GR" sz="2000" dirty="0">
-                <a:latin typeface="Arial" panose="020B0604020202020204" pitchFamily="34" charset="0"/>
-                <a:cs typeface="Arial" panose="020B0604020202020204" pitchFamily="34" charset="0"/>
-              </a:rPr>
-              <a:t>β≤α, </a:t>
-            </a:r>
-            <a:r>
-              <a:rPr lang="de-DE" sz="2000" dirty="0">
-                <a:latin typeface="Arial" panose="020B0604020202020204" pitchFamily="34" charset="0"/>
-                <a:cs typeface="Arial" panose="020B0604020202020204" pitchFamily="34" charset="0"/>
-              </a:rPr>
-              <a:t>wird der Teilbaum verworfen</a:t>
-            </a:r>
-            <a:br>
-              <a:rPr lang="de-DE" sz="2000" dirty="0">
-                <a:latin typeface="Arial" panose="020B0604020202020204" pitchFamily="34" charset="0"/>
-                <a:cs typeface="Arial" panose="020B0604020202020204" pitchFamily="34" charset="0"/>
-              </a:rPr>
-            </a:br>
-            <a:r>
-              <a:rPr lang="de-DE" sz="2000" dirty="0">
-                <a:latin typeface="Arial" panose="020B0604020202020204" pitchFamily="34" charset="0"/>
-                <a:cs typeface="Arial" panose="020B0604020202020204" pitchFamily="34" charset="0"/>
-              </a:rPr>
-              <a:t>→ keine bessere Lösung mehr möglich</a:t>
-            </a:r>
-          </a:p>
-        </p:txBody>
-      </p:sp>
-    </p:spTree>
-    <p:extLst>
-      <p:ext uri="{BB962C8B-B14F-4D97-AF65-F5344CB8AC3E}">
-        <p14:creationId xmlns:p14="http://schemas.microsoft.com/office/powerpoint/2010/main" val="2854285993"/>
-      </p:ext>
-    </p:extLst>
-  </p:cSld>
-  <p:clrMapOvr>
-    <a:masterClrMapping/>
-  </p:clrMapOvr>
-</p:sld>
-</file>
-
-<file path=ppt/slides/slide23.xml><?xml version="1.0" encoding="utf-8"?>
-<p:sld xmlns:a="http://schemas.openxmlformats.org/drawingml/2006/main" xmlns:r="http://schemas.openxmlformats.org/officeDocument/2006/relationships" xmlns:p="http://schemas.openxmlformats.org/presentationml/2006/main">
-  <p:cSld>
     <p:bg>
       <p:bgPr>
         <a:blipFill dpi="0" rotWithShape="1">
@@ -9287,7 +8656,7 @@
 </p:sld>
 </file>
 
-<file path=ppt/slides/slide24.xml><?xml version="1.0" encoding="utf-8"?>
+<file path=ppt/slides/slide21.xml><?xml version="1.0" encoding="utf-8"?>
 <p:sld xmlns:a="http://schemas.openxmlformats.org/drawingml/2006/main" xmlns:r="http://schemas.openxmlformats.org/officeDocument/2006/relationships" xmlns:p="http://schemas.openxmlformats.org/presentationml/2006/main">
   <p:cSld>
     <p:bg>
@@ -9580,6 +8949,15 @@
                 <a:latin typeface="Arial" panose="020B0604020202020204" pitchFamily="34" charset="0"/>
                 <a:cs typeface="Arial" panose="020B0604020202020204" pitchFamily="34" charset="0"/>
               </a:rPr>
+              <a:t>b = 3</a:t>
+            </a:r>
+          </a:p>
+          <a:p>
+            <a:r>
+              <a:rPr lang="de-DE" sz="2000" dirty="0">
+                <a:latin typeface="Arial" panose="020B0604020202020204" pitchFamily="34" charset="0"/>
+                <a:cs typeface="Arial" panose="020B0604020202020204" pitchFamily="34" charset="0"/>
+              </a:rPr>
               <a:t>Erstes Blatt: Wert = 5 → 𝛼=5 weil 5&gt;3</a:t>
             </a:r>
             <a:endParaRPr lang="el-GR" sz="2000" dirty="0">
@@ -9662,7 +9040,7 @@
                 <a:latin typeface="Arial" panose="020B0604020202020204" pitchFamily="34" charset="0"/>
                 <a:cs typeface="Arial" panose="020B0604020202020204" pitchFamily="34" charset="0"/>
               </a:rPr>
-              <a:t>→ Gegner (</a:t>
+              <a:t>→ (</a:t>
             </a:r>
             <a:r>
               <a:rPr lang="de-DE" sz="2000" dirty="0" err="1">
@@ -9733,7 +9111,7 @@
 </p:sld>
 </file>
 
-<file path=ppt/slides/slide25.xml><?xml version="1.0" encoding="utf-8"?>
+<file path=ppt/slides/slide22.xml><?xml version="1.0" encoding="utf-8"?>
 <p:sld xmlns:a="http://schemas.openxmlformats.org/drawingml/2006/main" xmlns:r="http://schemas.openxmlformats.org/officeDocument/2006/relationships" xmlns:p="http://schemas.openxmlformats.org/presentationml/2006/main">
   <p:cSld>
     <p:bg>
@@ -9798,7 +9176,7 @@
                 <a:latin typeface="Arial" panose="020B0604020202020204" pitchFamily="34" charset="0"/>
                 <a:cs typeface="Arial" panose="020B0604020202020204" pitchFamily="34" charset="0"/>
               </a:rPr>
-              <a:t>Bewertungsfunktion</a:t>
+              <a:t>Bewertungsfunktion - Stockfish</a:t>
             </a:r>
           </a:p>
         </p:txBody>
@@ -10077,29 +9455,6 @@
                 <a:latin typeface="Arial" panose="020B0604020202020204" pitchFamily="34" charset="0"/>
                 <a:cs typeface="Arial" panose="020B0604020202020204" pitchFamily="34" charset="0"/>
               </a:rPr>
-              <a:t>Bewertung ist </a:t>
-            </a:r>
-            <a:r>
-              <a:rPr lang="de-DE" sz="2000" b="1" dirty="0">
-                <a:latin typeface="Arial" panose="020B0604020202020204" pitchFamily="34" charset="0"/>
-                <a:cs typeface="Arial" panose="020B0604020202020204" pitchFamily="34" charset="0"/>
-              </a:rPr>
-              <a:t>nicht starr</a:t>
-            </a:r>
-            <a:r>
-              <a:rPr lang="de-DE" sz="2000" dirty="0">
-                <a:latin typeface="Arial" panose="020B0604020202020204" pitchFamily="34" charset="0"/>
-                <a:cs typeface="Arial" panose="020B0604020202020204" pitchFamily="34" charset="0"/>
-              </a:rPr>
-              <a:t>, sondern gleitend</a:t>
-            </a:r>
-          </a:p>
-          <a:p>
-            <a:r>
-              <a:rPr lang="de-DE" sz="2000" dirty="0">
-                <a:latin typeface="Arial" panose="020B0604020202020204" pitchFamily="34" charset="0"/>
-                <a:cs typeface="Arial" panose="020B0604020202020204" pitchFamily="34" charset="0"/>
-              </a:rPr>
               <a:t>Hängt vom </a:t>
             </a:r>
             <a:r>
@@ -10161,7 +9516,7 @@
 </p:sld>
 </file>
 
-<file path=ppt/slides/slide26.xml><?xml version="1.0" encoding="utf-8"?>
+<file path=ppt/slides/slide23.xml><?xml version="1.0" encoding="utf-8"?>
 <p:sld xmlns:a="http://schemas.openxmlformats.org/drawingml/2006/main" xmlns:r="http://schemas.openxmlformats.org/officeDocument/2006/relationships" xmlns:p="http://schemas.openxmlformats.org/presentationml/2006/main">
   <p:cSld>
     <p:spTree>
@@ -11100,7 +10455,7 @@
 </p:sld>
 </file>
 
-<file path=ppt/slides/slide27.xml><?xml version="1.0" encoding="utf-8"?>
+<file path=ppt/slides/slide24.xml><?xml version="1.0" encoding="utf-8"?>
 <p:sld xmlns:a="http://schemas.openxmlformats.org/drawingml/2006/main" xmlns:r="http://schemas.openxmlformats.org/officeDocument/2006/relationships" xmlns:p="http://schemas.openxmlformats.org/presentationml/2006/main">
   <p:cSld>
     <p:spTree>
@@ -11417,7 +10772,7 @@
 </p:sld>
 </file>
 
-<file path=ppt/slides/slide28.xml><?xml version="1.0" encoding="utf-8"?>
+<file path=ppt/slides/slide25.xml><?xml version="1.0" encoding="utf-8"?>
 <p:sld xmlns:a="http://schemas.openxmlformats.org/drawingml/2006/main" xmlns:r="http://schemas.openxmlformats.org/officeDocument/2006/relationships" xmlns:p="http://schemas.openxmlformats.org/presentationml/2006/main">
   <p:cSld>
     <p:spTree>
@@ -11698,7 +11053,7 @@
 </p:sld>
 </file>
 
-<file path=ppt/slides/slide29.xml><?xml version="1.0" encoding="utf-8"?>
+<file path=ppt/slides/slide26.xml><?xml version="1.0" encoding="utf-8"?>
 <p:sld xmlns:a="http://schemas.openxmlformats.org/drawingml/2006/main" xmlns:r="http://schemas.openxmlformats.org/officeDocument/2006/relationships" xmlns:p="http://schemas.openxmlformats.org/presentationml/2006/main">
   <p:cSld>
     <p:bg>
@@ -12085,150 +11440,7 @@
 </p:sld>
 </file>
 
-<file path=ppt/slides/slide3.xml><?xml version="1.0" encoding="utf-8"?>
-<p:sld xmlns:a="http://schemas.openxmlformats.org/drawingml/2006/main" xmlns:r="http://schemas.openxmlformats.org/officeDocument/2006/relationships" xmlns:p="http://schemas.openxmlformats.org/presentationml/2006/main">
-  <p:cSld>
-    <p:spTree>
-      <p:nvGrpSpPr>
-        <p:cNvPr id="1" name=""/>
-        <p:cNvGrpSpPr/>
-        <p:nvPr/>
-      </p:nvGrpSpPr>
-      <p:grpSpPr>
-        <a:xfrm>
-          <a:off x="0" y="0"/>
-          <a:ext cx="0" cy="0"/>
-          <a:chOff x="0" y="0"/>
-          <a:chExt cx="0" cy="0"/>
-        </a:xfrm>
-      </p:grpSpPr>
-      <p:sp>
-        <p:nvSpPr>
-          <p:cNvPr id="2" name="Title 1"/>
-          <p:cNvSpPr>
-            <a:spLocks noGrp="1"/>
-          </p:cNvSpPr>
-          <p:nvPr>
-            <p:ph type="title"/>
-          </p:nvPr>
-        </p:nvSpPr>
-        <p:spPr/>
-        <p:txBody>
-          <a:bodyPr/>
-          <a:lstStyle/>
-          <a:p>
-            <a:pPr algn="l"/>
-            <a:r>
-              <a:rPr lang="en-US" dirty="0" err="1">
-                <a:latin typeface="Arial" panose="020B0604020202020204" pitchFamily="34" charset="0"/>
-                <a:cs typeface="Arial" panose="020B0604020202020204" pitchFamily="34" charset="0"/>
-              </a:rPr>
-              <a:t>Einleitung</a:t>
-            </a:r>
-            <a:endParaRPr lang="en-US" dirty="0">
-              <a:latin typeface="Arial" panose="020B0604020202020204" pitchFamily="34" charset="0"/>
-              <a:cs typeface="Arial" panose="020B0604020202020204" pitchFamily="34" charset="0"/>
-            </a:endParaRPr>
-          </a:p>
-        </p:txBody>
-      </p:sp>
-      <p:sp>
-        <p:nvSpPr>
-          <p:cNvPr id="3" name="Content Placeholder 2"/>
-          <p:cNvSpPr>
-            <a:spLocks noGrp="1"/>
-          </p:cNvSpPr>
-          <p:nvPr>
-            <p:ph idx="1"/>
-          </p:nvPr>
-        </p:nvSpPr>
-        <p:spPr/>
-        <p:txBody>
-          <a:bodyPr>
-            <a:noAutofit/>
-          </a:bodyPr>
-          <a:lstStyle/>
-          <a:p>
-            <a:r>
-              <a:rPr lang="de-DE" sz="2601" dirty="0">
-                <a:latin typeface="Arial" panose="020B0604020202020204" pitchFamily="34" charset="0"/>
-                <a:cs typeface="Arial" panose="020B0604020202020204" pitchFamily="34" charset="0"/>
-              </a:rPr>
-              <a:t>Schon Alan Turing arbeitete mit seinen Studierenden an Schach-Algorithmen(„</a:t>
-            </a:r>
-            <a:r>
-              <a:rPr lang="de-DE" sz="2601" dirty="0" err="1">
-                <a:latin typeface="Arial" panose="020B0604020202020204" pitchFamily="34" charset="0"/>
-                <a:cs typeface="Arial" panose="020B0604020202020204" pitchFamily="34" charset="0"/>
-              </a:rPr>
-              <a:t>Turochamp</a:t>
-            </a:r>
-            <a:r>
-              <a:rPr lang="de-DE" sz="2601" dirty="0">
-                <a:latin typeface="Arial" panose="020B0604020202020204" pitchFamily="34" charset="0"/>
-                <a:cs typeface="Arial" panose="020B0604020202020204" pitchFamily="34" charset="0"/>
-              </a:rPr>
-              <a:t>“)</a:t>
-            </a:r>
-          </a:p>
-          <a:p>
-            <a:endParaRPr lang="de-DE" sz="2601" dirty="0">
-              <a:latin typeface="Arial" panose="020B0604020202020204" pitchFamily="34" charset="0"/>
-              <a:cs typeface="Arial" panose="020B0604020202020204" pitchFamily="34" charset="0"/>
-            </a:endParaRPr>
-          </a:p>
-          <a:p>
-            <a:r>
-              <a:rPr lang="de-DE" sz="2601" dirty="0">
-                <a:latin typeface="Arial" panose="020B0604020202020204" pitchFamily="34" charset="0"/>
-                <a:cs typeface="Arial" panose="020B0604020202020204" pitchFamily="34" charset="0"/>
-              </a:rPr>
-              <a:t>Schach gilt als besonders herausfordernd wegen:</a:t>
-            </a:r>
-          </a:p>
-          <a:p>
-            <a:r>
-              <a:rPr lang="de-DE" sz="2601" dirty="0">
-                <a:latin typeface="Arial" panose="020B0604020202020204" pitchFamily="34" charset="0"/>
-                <a:cs typeface="Arial" panose="020B0604020202020204" pitchFamily="34" charset="0"/>
-              </a:rPr>
-              <a:t>enormer Komplexität</a:t>
-            </a:r>
-          </a:p>
-          <a:p>
-            <a:r>
-              <a:rPr lang="de-DE" sz="2601" dirty="0">
-                <a:latin typeface="Arial" panose="020B0604020202020204" pitchFamily="34" charset="0"/>
-                <a:cs typeface="Arial" panose="020B0604020202020204" pitchFamily="34" charset="0"/>
-              </a:rPr>
-              <a:t>~10¹²⁰ möglicher Stellungen nach 40 Zügen</a:t>
-            </a:r>
-          </a:p>
-          <a:p>
-            <a:r>
-              <a:rPr lang="de-DE" sz="2601" dirty="0">
-                <a:latin typeface="Arial" panose="020B0604020202020204" pitchFamily="34" charset="0"/>
-                <a:cs typeface="Arial" panose="020B0604020202020204" pitchFamily="34" charset="0"/>
-              </a:rPr>
-              <a:t>Zum Vergleich: geschätzte Anzahl der Atome im Universum: ~10⁸⁰</a:t>
-            </a:r>
-          </a:p>
-        </p:txBody>
-      </p:sp>
-    </p:spTree>
-    <p:extLst>
-      <p:ext uri="{BB962C8B-B14F-4D97-AF65-F5344CB8AC3E}">
-        <p14:creationId xmlns:p14="http://schemas.microsoft.com/office/powerpoint/2010/main" val="4103309497"/>
-      </p:ext>
-    </p:extLst>
-  </p:cSld>
-  <p:clrMapOvr>
-    <a:masterClrMapping/>
-  </p:clrMapOvr>
-</p:sld>
-</file>
-
-<file path=ppt/slides/slide30.xml><?xml version="1.0" encoding="utf-8"?>
+<file path=ppt/slides/slide27.xml><?xml version="1.0" encoding="utf-8"?>
 <p:sld xmlns:a="http://schemas.openxmlformats.org/drawingml/2006/main" xmlns:r="http://schemas.openxmlformats.org/officeDocument/2006/relationships" xmlns:p="http://schemas.openxmlformats.org/presentationml/2006/main">
   <p:cSld>
     <p:bg>
@@ -12734,7 +11946,7 @@
 </p:sld>
 </file>
 
-<file path=ppt/slides/slide31.xml><?xml version="1.0" encoding="utf-8"?>
+<file path=ppt/slides/slide28.xml><?xml version="1.0" encoding="utf-8"?>
 <p:sld xmlns:a="http://schemas.openxmlformats.org/drawingml/2006/main" xmlns:r="http://schemas.openxmlformats.org/officeDocument/2006/relationships" xmlns:p="http://schemas.openxmlformats.org/presentationml/2006/main">
   <p:cSld>
     <p:bg>
@@ -13055,7 +12267,7 @@
 </p:sld>
 </file>
 
-<file path=ppt/slides/slide32.xml><?xml version="1.0" encoding="utf-8"?>
+<file path=ppt/slides/slide29.xml><?xml version="1.0" encoding="utf-8"?>
 <p:sld xmlns:a="http://schemas.openxmlformats.org/drawingml/2006/main" xmlns:r="http://schemas.openxmlformats.org/officeDocument/2006/relationships" xmlns:p="http://schemas.openxmlformats.org/presentationml/2006/main">
   <p:cSld>
     <p:bg>
@@ -13376,7 +12588,150 @@
 </p:sld>
 </file>
 
-<file path=ppt/slides/slide33.xml><?xml version="1.0" encoding="utf-8"?>
+<file path=ppt/slides/slide3.xml><?xml version="1.0" encoding="utf-8"?>
+<p:sld xmlns:a="http://schemas.openxmlformats.org/drawingml/2006/main" xmlns:r="http://schemas.openxmlformats.org/officeDocument/2006/relationships" xmlns:p="http://schemas.openxmlformats.org/presentationml/2006/main">
+  <p:cSld>
+    <p:spTree>
+      <p:nvGrpSpPr>
+        <p:cNvPr id="1" name=""/>
+        <p:cNvGrpSpPr/>
+        <p:nvPr/>
+      </p:nvGrpSpPr>
+      <p:grpSpPr>
+        <a:xfrm>
+          <a:off x="0" y="0"/>
+          <a:ext cx="0" cy="0"/>
+          <a:chOff x="0" y="0"/>
+          <a:chExt cx="0" cy="0"/>
+        </a:xfrm>
+      </p:grpSpPr>
+      <p:sp>
+        <p:nvSpPr>
+          <p:cNvPr id="2" name="Title 1"/>
+          <p:cNvSpPr>
+            <a:spLocks noGrp="1"/>
+          </p:cNvSpPr>
+          <p:nvPr>
+            <p:ph type="title"/>
+          </p:nvPr>
+        </p:nvSpPr>
+        <p:spPr/>
+        <p:txBody>
+          <a:bodyPr/>
+          <a:lstStyle/>
+          <a:p>
+            <a:pPr algn="l"/>
+            <a:r>
+              <a:rPr lang="en-US" dirty="0" err="1">
+                <a:latin typeface="Arial" panose="020B0604020202020204" pitchFamily="34" charset="0"/>
+                <a:cs typeface="Arial" panose="020B0604020202020204" pitchFamily="34" charset="0"/>
+              </a:rPr>
+              <a:t>Einleitung</a:t>
+            </a:r>
+            <a:endParaRPr lang="en-US" dirty="0">
+              <a:latin typeface="Arial" panose="020B0604020202020204" pitchFamily="34" charset="0"/>
+              <a:cs typeface="Arial" panose="020B0604020202020204" pitchFamily="34" charset="0"/>
+            </a:endParaRPr>
+          </a:p>
+        </p:txBody>
+      </p:sp>
+      <p:sp>
+        <p:nvSpPr>
+          <p:cNvPr id="3" name="Content Placeholder 2"/>
+          <p:cNvSpPr>
+            <a:spLocks noGrp="1"/>
+          </p:cNvSpPr>
+          <p:nvPr>
+            <p:ph idx="1"/>
+          </p:nvPr>
+        </p:nvSpPr>
+        <p:spPr/>
+        <p:txBody>
+          <a:bodyPr>
+            <a:noAutofit/>
+          </a:bodyPr>
+          <a:lstStyle/>
+          <a:p>
+            <a:r>
+              <a:rPr lang="de-DE" sz="2601" dirty="0">
+                <a:latin typeface="Arial" panose="020B0604020202020204" pitchFamily="34" charset="0"/>
+                <a:cs typeface="Arial" panose="020B0604020202020204" pitchFamily="34" charset="0"/>
+              </a:rPr>
+              <a:t>Schon Alan Turing arbeitete mit seinen Studierenden an Schach-Algorithmen(„</a:t>
+            </a:r>
+            <a:r>
+              <a:rPr lang="de-DE" sz="2601" dirty="0" err="1">
+                <a:latin typeface="Arial" panose="020B0604020202020204" pitchFamily="34" charset="0"/>
+                <a:cs typeface="Arial" panose="020B0604020202020204" pitchFamily="34" charset="0"/>
+              </a:rPr>
+              <a:t>Turochamp</a:t>
+            </a:r>
+            <a:r>
+              <a:rPr lang="de-DE" sz="2601" dirty="0">
+                <a:latin typeface="Arial" panose="020B0604020202020204" pitchFamily="34" charset="0"/>
+                <a:cs typeface="Arial" panose="020B0604020202020204" pitchFamily="34" charset="0"/>
+              </a:rPr>
+              <a:t>“)</a:t>
+            </a:r>
+          </a:p>
+          <a:p>
+            <a:endParaRPr lang="de-DE" sz="2601" dirty="0">
+              <a:latin typeface="Arial" panose="020B0604020202020204" pitchFamily="34" charset="0"/>
+              <a:cs typeface="Arial" panose="020B0604020202020204" pitchFamily="34" charset="0"/>
+            </a:endParaRPr>
+          </a:p>
+          <a:p>
+            <a:r>
+              <a:rPr lang="de-DE" sz="2601" dirty="0">
+                <a:latin typeface="Arial" panose="020B0604020202020204" pitchFamily="34" charset="0"/>
+                <a:cs typeface="Arial" panose="020B0604020202020204" pitchFamily="34" charset="0"/>
+              </a:rPr>
+              <a:t>Schach gilt als besonders herausfordernd wegen:</a:t>
+            </a:r>
+          </a:p>
+          <a:p>
+            <a:r>
+              <a:rPr lang="de-DE" sz="2601" dirty="0">
+                <a:latin typeface="Arial" panose="020B0604020202020204" pitchFamily="34" charset="0"/>
+                <a:cs typeface="Arial" panose="020B0604020202020204" pitchFamily="34" charset="0"/>
+              </a:rPr>
+              <a:t>enormer Komplexität</a:t>
+            </a:r>
+          </a:p>
+          <a:p>
+            <a:r>
+              <a:rPr lang="de-DE" sz="2601" dirty="0">
+                <a:latin typeface="Arial" panose="020B0604020202020204" pitchFamily="34" charset="0"/>
+                <a:cs typeface="Arial" panose="020B0604020202020204" pitchFamily="34" charset="0"/>
+              </a:rPr>
+              <a:t>~10¹²⁰ möglicher Stellungen nach 40 Zügen</a:t>
+            </a:r>
+          </a:p>
+          <a:p>
+            <a:r>
+              <a:rPr lang="de-DE" sz="2601" dirty="0">
+                <a:latin typeface="Arial" panose="020B0604020202020204" pitchFamily="34" charset="0"/>
+                <a:cs typeface="Arial" panose="020B0604020202020204" pitchFamily="34" charset="0"/>
+              </a:rPr>
+              <a:t>Zum Vergleich: geschätzte Anzahl der Atome im Universum: ~10⁸⁰</a:t>
+            </a:r>
+          </a:p>
+        </p:txBody>
+      </p:sp>
+    </p:spTree>
+    <p:extLst>
+      <p:ext uri="{BB962C8B-B14F-4D97-AF65-F5344CB8AC3E}">
+        <p14:creationId xmlns:p14="http://schemas.microsoft.com/office/powerpoint/2010/main" val="4103309497"/>
+      </p:ext>
+    </p:extLst>
+  </p:cSld>
+  <p:clrMapOvr>
+    <a:masterClrMapping/>
+  </p:clrMapOvr>
+</p:sld>
+</file>
+
+<file path=ppt/slides/slide30.xml><?xml version="1.0" encoding="utf-8"?>
 <p:sld xmlns:a="http://schemas.openxmlformats.org/drawingml/2006/main" xmlns:r="http://schemas.openxmlformats.org/officeDocument/2006/relationships" xmlns:p="http://schemas.openxmlformats.org/presentationml/2006/main">
   <p:cSld>
     <p:spTree>
@@ -14333,7 +13688,7 @@
 </p:sld>
 </file>
 
-<file path=ppt/slides/slide34.xml><?xml version="1.0" encoding="utf-8"?>
+<file path=ppt/slides/slide31.xml><?xml version="1.0" encoding="utf-8"?>
 <p:sld xmlns:a="http://schemas.openxmlformats.org/drawingml/2006/main" xmlns:r="http://schemas.openxmlformats.org/officeDocument/2006/relationships" xmlns:p="http://schemas.openxmlformats.org/presentationml/2006/main">
   <p:cSld>
     <p:spTree>
@@ -14439,15 +13794,6 @@
                 <a:cs typeface="Arial" panose="020B0604020202020204" pitchFamily="34" charset="0"/>
               </a:rPr>
               <a:t>Reduktion der Klassenanzahl</a:t>
-            </a:r>
-          </a:p>
-          <a:p>
-            <a:r>
-              <a:rPr lang="de-DE" sz="2400" dirty="0">
-                <a:latin typeface="Arial" panose="020B0604020202020204" pitchFamily="34" charset="0"/>
-                <a:cs typeface="Arial" panose="020B0604020202020204" pitchFamily="34" charset="0"/>
-              </a:rPr>
-              <a:t>Modell kennt keine legalen Züge → produziert ungültige Vorhersagen</a:t>
             </a:r>
           </a:p>
           <a:p>
@@ -14563,7 +13909,7 @@
 </p:sld>
 </file>
 
-<file path=ppt/slides/slide35.xml><?xml version="1.0" encoding="utf-8"?>
+<file path=ppt/slides/slide32.xml><?xml version="1.0" encoding="utf-8"?>
 <p:sld xmlns:a="http://schemas.openxmlformats.org/drawingml/2006/main" xmlns:r="http://schemas.openxmlformats.org/officeDocument/2006/relationships" xmlns:p="http://schemas.openxmlformats.org/presentationml/2006/main">
   <p:cSld>
     <p:spTree>
@@ -14757,7 +14103,7 @@
 </p:sld>
 </file>
 
-<file path=ppt/slides/slide36.xml><?xml version="1.0" encoding="utf-8"?>
+<file path=ppt/slides/slide33.xml><?xml version="1.0" encoding="utf-8"?>
 <p:sld xmlns:a="http://schemas.openxmlformats.org/drawingml/2006/main" xmlns:r="http://schemas.openxmlformats.org/officeDocument/2006/relationships" xmlns:p="http://schemas.openxmlformats.org/presentationml/2006/main">
   <p:cSld>
     <p:spTree>
@@ -14957,153 +14303,6 @@
 </file>
 
 <file path=ppt/slides/slide4.xml><?xml version="1.0" encoding="utf-8"?>
-<p:sld xmlns:a="http://schemas.openxmlformats.org/drawingml/2006/main" xmlns:r="http://schemas.openxmlformats.org/officeDocument/2006/relationships" xmlns:p="http://schemas.openxmlformats.org/presentationml/2006/main">
-  <p:cSld>
-    <p:spTree>
-      <p:nvGrpSpPr>
-        <p:cNvPr id="1" name="">
-          <a:extLst>
-            <a:ext uri="{FF2B5EF4-FFF2-40B4-BE49-F238E27FC236}">
-              <a16:creationId xmlns:a16="http://schemas.microsoft.com/office/drawing/2014/main" id="{BB1B90C4-A73B-8FC7-B97C-ABFF808BB11A}"/>
-            </a:ext>
-          </a:extLst>
-        </p:cNvPr>
-        <p:cNvGrpSpPr/>
-        <p:nvPr/>
-      </p:nvGrpSpPr>
-      <p:grpSpPr>
-        <a:xfrm>
-          <a:off x="0" y="0"/>
-          <a:ext cx="0" cy="0"/>
-          <a:chOff x="0" y="0"/>
-          <a:chExt cx="0" cy="0"/>
-        </a:xfrm>
-      </p:grpSpPr>
-      <p:sp>
-        <p:nvSpPr>
-          <p:cNvPr id="2" name="Title 1">
-            <a:extLst>
-              <a:ext uri="{FF2B5EF4-FFF2-40B4-BE49-F238E27FC236}">
-                <a16:creationId xmlns:a16="http://schemas.microsoft.com/office/drawing/2014/main" id="{2B7705CE-7EF2-7B36-8391-2CF714EDA914}"/>
-              </a:ext>
-            </a:extLst>
-          </p:cNvPr>
-          <p:cNvSpPr>
-            <a:spLocks noGrp="1"/>
-          </p:cNvSpPr>
-          <p:nvPr>
-            <p:ph type="title"/>
-          </p:nvPr>
-        </p:nvSpPr>
-        <p:spPr/>
-        <p:txBody>
-          <a:bodyPr/>
-          <a:lstStyle/>
-          <a:p>
-            <a:pPr algn="l"/>
-            <a:r>
-              <a:rPr lang="en-US" dirty="0" err="1">
-                <a:latin typeface="Arial" panose="020B0604020202020204" pitchFamily="34" charset="0"/>
-                <a:cs typeface="Arial" panose="020B0604020202020204" pitchFamily="34" charset="0"/>
-              </a:rPr>
-              <a:t>Einleitung</a:t>
-            </a:r>
-            <a:endParaRPr lang="en-US" dirty="0">
-              <a:latin typeface="Arial" panose="020B0604020202020204" pitchFamily="34" charset="0"/>
-              <a:cs typeface="Arial" panose="020B0604020202020204" pitchFamily="34" charset="0"/>
-            </a:endParaRPr>
-          </a:p>
-        </p:txBody>
-      </p:sp>
-      <p:sp>
-        <p:nvSpPr>
-          <p:cNvPr id="3" name="Content Placeholder 2">
-            <a:extLst>
-              <a:ext uri="{FF2B5EF4-FFF2-40B4-BE49-F238E27FC236}">
-                <a16:creationId xmlns:a16="http://schemas.microsoft.com/office/drawing/2014/main" id="{23C360F1-47AE-4093-DB77-67B919DD2269}"/>
-              </a:ext>
-            </a:extLst>
-          </p:cNvPr>
-          <p:cNvSpPr>
-            <a:spLocks noGrp="1"/>
-          </p:cNvSpPr>
-          <p:nvPr>
-            <p:ph idx="1"/>
-          </p:nvPr>
-        </p:nvSpPr>
-        <p:spPr/>
-        <p:txBody>
-          <a:bodyPr>
-            <a:noAutofit/>
-          </a:bodyPr>
-          <a:lstStyle/>
-          <a:p>
-            <a:pPr marL="0" indent="0">
-              <a:buNone/>
-            </a:pPr>
-            <a:endParaRPr lang="de-DE" dirty="0">
-              <a:latin typeface="Arial" panose="020B0604020202020204" pitchFamily="34" charset="0"/>
-              <a:cs typeface="Arial" panose="020B0604020202020204" pitchFamily="34" charset="0"/>
-            </a:endParaRPr>
-          </a:p>
-          <a:p>
-            <a:r>
-              <a:rPr lang="de-DE" dirty="0">
-                <a:latin typeface="Arial" panose="020B0604020202020204" pitchFamily="34" charset="0"/>
-                <a:cs typeface="Arial" panose="020B0604020202020204" pitchFamily="34" charset="0"/>
-              </a:rPr>
-              <a:t>Ziel des Projekts:</a:t>
-            </a:r>
-          </a:p>
-          <a:p>
-            <a:endParaRPr lang="de-DE" dirty="0">
-              <a:latin typeface="Arial" panose="020B0604020202020204" pitchFamily="34" charset="0"/>
-              <a:cs typeface="Arial" panose="020B0604020202020204" pitchFamily="34" charset="0"/>
-            </a:endParaRPr>
-          </a:p>
-          <a:p>
-            <a:r>
-              <a:rPr lang="de-DE" dirty="0">
-                <a:latin typeface="Arial" panose="020B0604020202020204" pitchFamily="34" charset="0"/>
-                <a:cs typeface="Arial" panose="020B0604020202020204" pitchFamily="34" charset="0"/>
-              </a:rPr>
-              <a:t>Analyse der moderner Schach-KI Stockfish</a:t>
-            </a:r>
-          </a:p>
-          <a:p>
-            <a:r>
-              <a:rPr lang="de-DE" dirty="0">
-                <a:latin typeface="Arial" panose="020B0604020202020204" pitchFamily="34" charset="0"/>
-                <a:cs typeface="Arial" panose="020B0604020202020204" pitchFamily="34" charset="0"/>
-              </a:rPr>
-              <a:t>Verständnis für verwendete Algorithmen</a:t>
-            </a:r>
-          </a:p>
-          <a:p>
-            <a:r>
-              <a:rPr lang="de-DE" dirty="0">
-                <a:latin typeface="Arial" panose="020B0604020202020204" pitchFamily="34" charset="0"/>
-                <a:cs typeface="Arial" panose="020B0604020202020204" pitchFamily="34" charset="0"/>
-              </a:rPr>
-              <a:t>Implementierung einer eigenen Schach-KI-Architektur</a:t>
-            </a:r>
-          </a:p>
-        </p:txBody>
-      </p:sp>
-    </p:spTree>
-    <p:extLst>
-      <p:ext uri="{BB962C8B-B14F-4D97-AF65-F5344CB8AC3E}">
-        <p14:creationId xmlns:p14="http://schemas.microsoft.com/office/powerpoint/2010/main" val="2253831462"/>
-      </p:ext>
-    </p:extLst>
-  </p:cSld>
-  <p:clrMapOvr>
-    <a:masterClrMapping/>
-  </p:clrMapOvr>
-</p:sld>
-</file>
-
-<file path=ppt/slides/slide5.xml><?xml version="1.0" encoding="utf-8"?>
 <p:sld xmlns:a="http://schemas.openxmlformats.org/drawingml/2006/main" xmlns:r="http://schemas.openxmlformats.org/officeDocument/2006/relationships" xmlns:p="http://schemas.openxmlformats.org/presentationml/2006/main">
   <p:cSld>
     <p:spTree>
@@ -16028,7 +15227,7 @@
 </p:sld>
 </file>
 
-<file path=ppt/slides/slide6.xml><?xml version="1.0" encoding="utf-8"?>
+<file path=ppt/slides/slide5.xml><?xml version="1.0" encoding="utf-8"?>
 <p:sld xmlns:a="http://schemas.openxmlformats.org/drawingml/2006/main" xmlns:r="http://schemas.openxmlformats.org/officeDocument/2006/relationships" xmlns:p="http://schemas.openxmlformats.org/presentationml/2006/main">
   <p:cSld>
     <p:bg>
@@ -16155,15 +15354,6 @@
             </a:r>
           </a:p>
           <a:p>
-            <a:r>
-              <a:rPr lang="de-DE" dirty="0">
-                <a:latin typeface="Arial" panose="020B0604020202020204" pitchFamily="34" charset="0"/>
-                <a:cs typeface="Arial" panose="020B0604020202020204" pitchFamily="34" charset="0"/>
-              </a:rPr>
-              <a:t>Grundlage für viele Berechnungen für Stockfish</a:t>
-            </a:r>
-          </a:p>
-          <a:p>
             <a:endParaRPr lang="de-DE" dirty="0">
               <a:latin typeface="Arial" panose="020B0604020202020204" pitchFamily="34" charset="0"/>
               <a:cs typeface="Arial" panose="020B0604020202020204" pitchFamily="34" charset="0"/>
@@ -16184,7 +15374,7 @@
 </p:sld>
 </file>
 
-<file path=ppt/slides/slide7.xml><?xml version="1.0" encoding="utf-8"?>
+<file path=ppt/slides/slide6.xml><?xml version="1.0" encoding="utf-8"?>
 <p:sld xmlns:a="http://schemas.openxmlformats.org/drawingml/2006/main" xmlns:r="http://schemas.openxmlformats.org/officeDocument/2006/relationships" xmlns:p="http://schemas.openxmlformats.org/presentationml/2006/main">
   <p:cSld>
     <p:bg>
@@ -16691,7 +15881,7 @@
 </p:sld>
 </file>
 
-<file path=ppt/slides/slide8.xml><?xml version="1.0" encoding="utf-8"?>
+<file path=ppt/slides/slide7.xml><?xml version="1.0" encoding="utf-8"?>
 <p:sld xmlns:a="http://schemas.openxmlformats.org/drawingml/2006/main" xmlns:r="http://schemas.openxmlformats.org/officeDocument/2006/relationships" xmlns:p="http://schemas.openxmlformats.org/presentationml/2006/main">
   <p:cSld>
     <p:spTree>
@@ -16884,7 +16074,7 @@
 </p:sld>
 </file>
 
-<file path=ppt/slides/slide9.xml><?xml version="1.0" encoding="utf-8"?>
+<file path=ppt/slides/slide8.xml><?xml version="1.0" encoding="utf-8"?>
 <p:sld xmlns:a="http://schemas.openxmlformats.org/drawingml/2006/main" xmlns:r="http://schemas.openxmlformats.org/officeDocument/2006/relationships" xmlns:p="http://schemas.openxmlformats.org/presentationml/2006/main">
   <p:cSld>
     <p:spTree>
@@ -17081,6 +16271,216 @@
     <p:extLst>
       <p:ext uri="{BB962C8B-B14F-4D97-AF65-F5344CB8AC3E}">
         <p14:creationId xmlns:p14="http://schemas.microsoft.com/office/powerpoint/2010/main" val="3264969997"/>
+      </p:ext>
+    </p:extLst>
+  </p:cSld>
+  <p:clrMapOvr>
+    <a:masterClrMapping/>
+  </p:clrMapOvr>
+</p:sld>
+</file>
+
+<file path=ppt/slides/slide9.xml><?xml version="1.0" encoding="utf-8"?>
+<p:sld xmlns:a="http://schemas.openxmlformats.org/drawingml/2006/main" xmlns:r="http://schemas.openxmlformats.org/officeDocument/2006/relationships" xmlns:p="http://schemas.openxmlformats.org/presentationml/2006/main">
+  <p:cSld>
+    <p:spTree>
+      <p:nvGrpSpPr>
+        <p:cNvPr id="1" name="">
+          <a:extLst>
+            <a:ext uri="{FF2B5EF4-FFF2-40B4-BE49-F238E27FC236}">
+              <a16:creationId xmlns:a16="http://schemas.microsoft.com/office/drawing/2014/main" id="{4DB52E04-B4E5-D3D7-7506-817A44BE3D7D}"/>
+            </a:ext>
+          </a:extLst>
+        </p:cNvPr>
+        <p:cNvGrpSpPr/>
+        <p:nvPr/>
+      </p:nvGrpSpPr>
+      <p:grpSpPr>
+        <a:xfrm>
+          <a:off x="0" y="0"/>
+          <a:ext cx="0" cy="0"/>
+          <a:chOff x="0" y="0"/>
+          <a:chExt cx="0" cy="0"/>
+        </a:xfrm>
+      </p:grpSpPr>
+      <p:sp>
+        <p:nvSpPr>
+          <p:cNvPr id="4" name="Title 3">
+            <a:extLst>
+              <a:ext uri="{FF2B5EF4-FFF2-40B4-BE49-F238E27FC236}">
+                <a16:creationId xmlns:a16="http://schemas.microsoft.com/office/drawing/2014/main" id="{C1FD3E07-4716-F462-B251-0DD0B5D48F33}"/>
+              </a:ext>
+            </a:extLst>
+          </p:cNvPr>
+          <p:cNvSpPr>
+            <a:spLocks noGrp="1"/>
+          </p:cNvSpPr>
+          <p:nvPr>
+            <p:ph type="title"/>
+          </p:nvPr>
+        </p:nvSpPr>
+        <p:spPr/>
+        <p:txBody>
+          <a:bodyPr/>
+          <a:lstStyle/>
+          <a:p>
+            <a:pPr algn="l"/>
+            <a:r>
+              <a:rPr lang="en-US" dirty="0" err="1">
+                <a:latin typeface="Arial" panose="020B0604020202020204" pitchFamily="34" charset="0"/>
+                <a:cs typeface="Arial" panose="020B0604020202020204" pitchFamily="34" charset="0"/>
+              </a:rPr>
+              <a:t>Spielfiguren-Unterscheidung</a:t>
+            </a:r>
+            <a:endParaRPr lang="en-US" dirty="0">
+              <a:latin typeface="Arial" panose="020B0604020202020204" pitchFamily="34" charset="0"/>
+              <a:cs typeface="Arial" panose="020B0604020202020204" pitchFamily="34" charset="0"/>
+            </a:endParaRPr>
+          </a:p>
+        </p:txBody>
+      </p:sp>
+      <p:sp>
+        <p:nvSpPr>
+          <p:cNvPr id="16" name="Content Placeholder 4">
+            <a:extLst>
+              <a:ext uri="{FF2B5EF4-FFF2-40B4-BE49-F238E27FC236}">
+                <a16:creationId xmlns:a16="http://schemas.microsoft.com/office/drawing/2014/main" id="{CA69A693-C4D8-1A59-5E53-BE2CA6B7B749}"/>
+              </a:ext>
+            </a:extLst>
+          </p:cNvPr>
+          <p:cNvSpPr>
+            <a:spLocks noGrp="1"/>
+          </p:cNvSpPr>
+          <p:nvPr>
+            <p:ph sz="half" idx="2"/>
+          </p:nvPr>
+        </p:nvSpPr>
+        <p:spPr>
+          <a:xfrm>
+            <a:off x="576395" y="2207360"/>
+            <a:ext cx="7352066" cy="4581150"/>
+          </a:xfrm>
+        </p:spPr>
+        <p:txBody>
+          <a:bodyPr>
+            <a:noAutofit/>
+          </a:bodyPr>
+          <a:lstStyle/>
+          <a:p>
+            <a:pPr marL="0" indent="0">
+              <a:buNone/>
+            </a:pPr>
+            <a:r>
+              <a:rPr lang="de-DE" sz="2800" dirty="0">
+                <a:latin typeface="Arial" panose="020B0604020202020204" pitchFamily="34" charset="0"/>
+                <a:cs typeface="Arial" panose="020B0604020202020204" pitchFamily="34" charset="0"/>
+              </a:rPr>
+              <a:t> Dynamische Zugberechnung (ineffizient):</a:t>
+            </a:r>
+          </a:p>
+          <a:p>
+            <a:r>
+              <a:rPr lang="de-DE" sz="2800" dirty="0">
+                <a:latin typeface="Arial" panose="020B0604020202020204" pitchFamily="34" charset="0"/>
+                <a:cs typeface="Arial" panose="020B0604020202020204" pitchFamily="34" charset="0"/>
+              </a:rPr>
+              <a:t>Schrittweises Iterieren in alle Richtungen</a:t>
+            </a:r>
+          </a:p>
+          <a:p>
+            <a:r>
+              <a:rPr lang="de-DE" sz="2800" dirty="0">
+                <a:latin typeface="Arial" panose="020B0604020202020204" pitchFamily="34" charset="0"/>
+                <a:cs typeface="Arial" panose="020B0604020202020204" pitchFamily="34" charset="0"/>
+              </a:rPr>
+              <a:t>Prüfung jedes Feldes auf Belegung</a:t>
+            </a:r>
+          </a:p>
+          <a:p>
+            <a:r>
+              <a:rPr lang="de-DE" sz="2800" dirty="0">
+                <a:latin typeface="Arial" panose="020B0604020202020204" pitchFamily="34" charset="0"/>
+                <a:cs typeface="Arial" panose="020B0604020202020204" pitchFamily="34" charset="0"/>
+              </a:rPr>
+              <a:t>Abbruch bei Blocker</a:t>
+            </a:r>
+          </a:p>
+          <a:p>
+            <a:r>
+              <a:rPr lang="de-DE" sz="2800" dirty="0">
+                <a:latin typeface="Arial" panose="020B0604020202020204" pitchFamily="34" charset="0"/>
+                <a:cs typeface="Arial" panose="020B0604020202020204" pitchFamily="34" charset="0"/>
+              </a:rPr>
+              <a:t>Nur gegnerische Figuren dürfen "mitgeschlagen" werden</a:t>
+            </a:r>
+          </a:p>
+          <a:p>
+            <a:pPr marL="0" indent="0">
+              <a:buNone/>
+            </a:pPr>
+            <a:r>
+              <a:rPr lang="de-DE" sz="2800" dirty="0">
+                <a:latin typeface="Arial" panose="020B0604020202020204" pitchFamily="34" charset="0"/>
+                <a:cs typeface="Arial" panose="020B0604020202020204" pitchFamily="34" charset="0"/>
+              </a:rPr>
+              <a:t> </a:t>
+            </a:r>
+            <a:r>
+              <a:rPr lang="de-DE" sz="2800" dirty="0">
+                <a:solidFill>
+                  <a:srgbClr val="FFFF00"/>
+                </a:solidFill>
+                <a:latin typeface="Arial" panose="020B0604020202020204" pitchFamily="34" charset="0"/>
+                <a:cs typeface="Arial" panose="020B0604020202020204" pitchFamily="34" charset="0"/>
+              </a:rPr>
+              <a:t>Optimierung durch:</a:t>
+            </a:r>
+          </a:p>
+          <a:p>
+            <a:r>
+              <a:rPr lang="de-DE" sz="2800" dirty="0">
+                <a:latin typeface="Arial" panose="020B0604020202020204" pitchFamily="34" charset="0"/>
+                <a:cs typeface="Arial" panose="020B0604020202020204" pitchFamily="34" charset="0"/>
+              </a:rPr>
+              <a:t>Magic Bitboards</a:t>
+            </a:r>
+          </a:p>
+        </p:txBody>
+      </p:sp>
+      <p:pic>
+        <p:nvPicPr>
+          <p:cNvPr id="3" name="Grafik 2">
+            <a:extLst>
+              <a:ext uri="{FF2B5EF4-FFF2-40B4-BE49-F238E27FC236}">
+                <a16:creationId xmlns:a16="http://schemas.microsoft.com/office/drawing/2014/main" id="{932ABA45-E7B4-FFA6-22D3-667760C40301}"/>
+              </a:ext>
+            </a:extLst>
+          </p:cNvPr>
+          <p:cNvPicPr>
+            <a:picLocks noChangeAspect="1"/>
+          </p:cNvPicPr>
+          <p:nvPr/>
+        </p:nvPicPr>
+        <p:blipFill>
+          <a:blip r:embed="rId2"/>
+          <a:stretch>
+            <a:fillRect/>
+          </a:stretch>
+        </p:blipFill>
+        <p:spPr>
+          <a:xfrm>
+            <a:off x="8081164" y="1749245"/>
+            <a:ext cx="3858265" cy="3851026"/>
+          </a:xfrm>
+          <a:prstGeom prst="rect">
+            <a:avLst/>
+          </a:prstGeom>
+        </p:spPr>
+      </p:pic>
+    </p:spTree>
+    <p:extLst>
+      <p:ext uri="{BB962C8B-B14F-4D97-AF65-F5344CB8AC3E}">
+        <p14:creationId xmlns:p14="http://schemas.microsoft.com/office/powerpoint/2010/main" val="2006584541"/>
       </p:ext>
     </p:extLst>
   </p:cSld>

</xml_diff>